<commit_message>
merci de consulter la présentation
</commit_message>
<xml_diff>
--- a/docs/dataMigrator.pptx
+++ b/docs/dataMigrator.pptx
@@ -5,18 +5,30 @@
     <p:sldMasterId id="2147483900" r:id="rId1"/>
   </p:sldMasterIdLst>
   <p:notesMasterIdLst>
-    <p:notesMasterId r:id="rId11"/>
+    <p:notesMasterId r:id="rId23"/>
   </p:notesMasterIdLst>
   <p:sldIdLst>
     <p:sldId id="256" r:id="rId2"/>
     <p:sldId id="263" r:id="rId3"/>
-    <p:sldId id="257" r:id="rId4"/>
-    <p:sldId id="258" r:id="rId5"/>
-    <p:sldId id="259" r:id="rId6"/>
-    <p:sldId id="264" r:id="rId7"/>
-    <p:sldId id="260" r:id="rId8"/>
-    <p:sldId id="261" r:id="rId9"/>
-    <p:sldId id="262" r:id="rId10"/>
+    <p:sldId id="269" r:id="rId4"/>
+    <p:sldId id="270" r:id="rId5"/>
+    <p:sldId id="271" r:id="rId6"/>
+    <p:sldId id="272" r:id="rId7"/>
+    <p:sldId id="273" r:id="rId8"/>
+    <p:sldId id="260" r:id="rId9"/>
+    <p:sldId id="257" r:id="rId10"/>
+    <p:sldId id="258" r:id="rId11"/>
+    <p:sldId id="277" r:id="rId12"/>
+    <p:sldId id="259" r:id="rId13"/>
+    <p:sldId id="265" r:id="rId14"/>
+    <p:sldId id="264" r:id="rId15"/>
+    <p:sldId id="274" r:id="rId16"/>
+    <p:sldId id="275" r:id="rId17"/>
+    <p:sldId id="267" r:id="rId18"/>
+    <p:sldId id="278" r:id="rId19"/>
+    <p:sldId id="276" r:id="rId20"/>
+    <p:sldId id="261" r:id="rId21"/>
+    <p:sldId id="268" r:id="rId22"/>
   </p:sldIdLst>
   <p:sldSz cx="9144000" cy="6858000" type="screen4x3"/>
   <p:notesSz cx="6858000" cy="9144000"/>
@@ -115,6 +127,22 @@
       </a:defRPr>
     </a:lvl9pPr>
   </p:defaultTextStyle>
+  <p:extLst>
+    <p:ext uri="{EFAFB233-063F-42B5-8137-9DF3F51BA10A}">
+      <p15:sldGuideLst xmlns:p15="http://schemas.microsoft.com/office/powerpoint/2012/main">
+        <p15:guide id="1" orient="horz" pos="2160">
+          <p15:clr>
+            <a:srgbClr val="A4A3A4"/>
+          </p15:clr>
+        </p15:guide>
+        <p15:guide id="2" pos="2880">
+          <p15:clr>
+            <a:srgbClr val="A4A3A4"/>
+          </p15:clr>
+        </p15:guide>
+      </p15:sldGuideLst>
+    </p:ext>
+  </p:extLst>
 </p:presentation>
 </file>
 
@@ -1073,14 +1101,35 @@
         </dgm:presLayoutVars>
       </dgm:prSet>
       <dgm:spPr/>
+      <dgm:t>
+        <a:bodyPr/>
+        <a:lstStyle/>
+        <a:p>
+          <a:endParaRPr lang="fr-FR"/>
+        </a:p>
+      </dgm:t>
     </dgm:pt>
     <dgm:pt modelId="{F5924F81-9C6A-4A0A-BFE6-B829EEF86B90}" type="pres">
       <dgm:prSet presAssocID="{F5582CBA-0A42-4797-8211-5E2D720238C2}" presName="sibTrans" presStyleLbl="sibTrans2D1" presStyleIdx="0" presStyleCnt="4"/>
       <dgm:spPr/>
+      <dgm:t>
+        <a:bodyPr/>
+        <a:lstStyle/>
+        <a:p>
+          <a:endParaRPr lang="fr-FR"/>
+        </a:p>
+      </dgm:t>
     </dgm:pt>
     <dgm:pt modelId="{77BF6F8E-91B4-453C-9BC3-C37446874CFF}" type="pres">
       <dgm:prSet presAssocID="{F5582CBA-0A42-4797-8211-5E2D720238C2}" presName="connectorText" presStyleLbl="sibTrans2D1" presStyleIdx="0" presStyleCnt="4"/>
       <dgm:spPr/>
+      <dgm:t>
+        <a:bodyPr/>
+        <a:lstStyle/>
+        <a:p>
+          <a:endParaRPr lang="fr-FR"/>
+        </a:p>
+      </dgm:t>
     </dgm:pt>
     <dgm:pt modelId="{2201C4AF-9549-48B9-A192-A380AFED2F7C}" type="pres">
       <dgm:prSet presAssocID="{30BC2853-D363-40F3-AEDC-44F868D0FBEB}" presName="node" presStyleLbl="node1" presStyleIdx="1" presStyleCnt="5">
@@ -1089,14 +1138,35 @@
         </dgm:presLayoutVars>
       </dgm:prSet>
       <dgm:spPr/>
+      <dgm:t>
+        <a:bodyPr/>
+        <a:lstStyle/>
+        <a:p>
+          <a:endParaRPr lang="fr-FR"/>
+        </a:p>
+      </dgm:t>
     </dgm:pt>
     <dgm:pt modelId="{12E600D5-D9F9-4334-A949-60E249ED70E2}" type="pres">
       <dgm:prSet presAssocID="{8D55B200-50F3-43C0-99F5-291E1E11E5CF}" presName="sibTrans" presStyleLbl="sibTrans2D1" presStyleIdx="1" presStyleCnt="4"/>
       <dgm:spPr/>
+      <dgm:t>
+        <a:bodyPr/>
+        <a:lstStyle/>
+        <a:p>
+          <a:endParaRPr lang="fr-FR"/>
+        </a:p>
+      </dgm:t>
     </dgm:pt>
     <dgm:pt modelId="{EA52D8F3-737A-4A40-844C-F2114CFF3DD4}" type="pres">
       <dgm:prSet presAssocID="{8D55B200-50F3-43C0-99F5-291E1E11E5CF}" presName="connectorText" presStyleLbl="sibTrans2D1" presStyleIdx="1" presStyleCnt="4"/>
       <dgm:spPr/>
+      <dgm:t>
+        <a:bodyPr/>
+        <a:lstStyle/>
+        <a:p>
+          <a:endParaRPr lang="fr-FR"/>
+        </a:p>
+      </dgm:t>
     </dgm:pt>
     <dgm:pt modelId="{948A004A-B981-46ED-98B4-0146F9558DC4}" type="pres">
       <dgm:prSet presAssocID="{ECB04812-3440-4E3D-9928-E4F563B7540B}" presName="node" presStyleLbl="node1" presStyleIdx="2" presStyleCnt="5">
@@ -1105,14 +1175,35 @@
         </dgm:presLayoutVars>
       </dgm:prSet>
       <dgm:spPr/>
+      <dgm:t>
+        <a:bodyPr/>
+        <a:lstStyle/>
+        <a:p>
+          <a:endParaRPr lang="fr-FR"/>
+        </a:p>
+      </dgm:t>
     </dgm:pt>
     <dgm:pt modelId="{390FD976-A5C1-4178-ABD7-7DCE600E2744}" type="pres">
       <dgm:prSet presAssocID="{4EB5DBBE-DCE8-483E-B87F-89C8099CCBEE}" presName="sibTrans" presStyleLbl="sibTrans2D1" presStyleIdx="2" presStyleCnt="4"/>
       <dgm:spPr/>
+      <dgm:t>
+        <a:bodyPr/>
+        <a:lstStyle/>
+        <a:p>
+          <a:endParaRPr lang="fr-FR"/>
+        </a:p>
+      </dgm:t>
     </dgm:pt>
     <dgm:pt modelId="{BD41C635-399D-48C1-AB41-61B6E007F871}" type="pres">
       <dgm:prSet presAssocID="{4EB5DBBE-DCE8-483E-B87F-89C8099CCBEE}" presName="connectorText" presStyleLbl="sibTrans2D1" presStyleIdx="2" presStyleCnt="4"/>
       <dgm:spPr/>
+      <dgm:t>
+        <a:bodyPr/>
+        <a:lstStyle/>
+        <a:p>
+          <a:endParaRPr lang="fr-FR"/>
+        </a:p>
+      </dgm:t>
     </dgm:pt>
     <dgm:pt modelId="{07B860F2-B51C-4120-B320-15A3C6B61E6C}" type="pres">
       <dgm:prSet presAssocID="{2356175F-2237-4D41-A1E6-1D1072CBCE20}" presName="node" presStyleLbl="node1" presStyleIdx="3" presStyleCnt="5">
@@ -1121,14 +1212,35 @@
         </dgm:presLayoutVars>
       </dgm:prSet>
       <dgm:spPr/>
+      <dgm:t>
+        <a:bodyPr/>
+        <a:lstStyle/>
+        <a:p>
+          <a:endParaRPr lang="fr-FR"/>
+        </a:p>
+      </dgm:t>
     </dgm:pt>
     <dgm:pt modelId="{CDF37ACB-DED0-446D-B1E2-338040FBB106}" type="pres">
       <dgm:prSet presAssocID="{EC9F1E20-F065-4BDF-9BE9-EDCB4BC9E408}" presName="sibTrans" presStyleLbl="sibTrans2D1" presStyleIdx="3" presStyleCnt="4"/>
       <dgm:spPr/>
+      <dgm:t>
+        <a:bodyPr/>
+        <a:lstStyle/>
+        <a:p>
+          <a:endParaRPr lang="fr-FR"/>
+        </a:p>
+      </dgm:t>
     </dgm:pt>
     <dgm:pt modelId="{3A7B5425-ACA3-4182-8046-59D40198B5A5}" type="pres">
       <dgm:prSet presAssocID="{EC9F1E20-F065-4BDF-9BE9-EDCB4BC9E408}" presName="connectorText" presStyleLbl="sibTrans2D1" presStyleIdx="3" presStyleCnt="4"/>
       <dgm:spPr/>
+      <dgm:t>
+        <a:bodyPr/>
+        <a:lstStyle/>
+        <a:p>
+          <a:endParaRPr lang="fr-FR"/>
+        </a:p>
+      </dgm:t>
     </dgm:pt>
     <dgm:pt modelId="{C93E592C-9798-4ACE-92C8-6F50D638F15B}" type="pres">
       <dgm:prSet presAssocID="{1E2C23EF-CAAF-4E2F-9004-5E6F8BE52971}" presName="node" presStyleLbl="node1" presStyleIdx="4" presStyleCnt="5">
@@ -1137,41 +1249,48 @@
         </dgm:presLayoutVars>
       </dgm:prSet>
       <dgm:spPr/>
+      <dgm:t>
+        <a:bodyPr/>
+        <a:lstStyle/>
+        <a:p>
+          <a:endParaRPr lang="fr-FR"/>
+        </a:p>
+      </dgm:t>
     </dgm:pt>
   </dgm:ptLst>
   <dgm:cxnLst>
+    <dgm:cxn modelId="{D10AE298-9F75-42AD-B053-4415532247DE}" type="presOf" srcId="{15D6624B-5693-4B81-B217-507BC36812D9}" destId="{B5145141-19DE-43D6-BA90-2A30941ABD4E}" srcOrd="0" destOrd="0" presId="urn:microsoft.com/office/officeart/2005/8/layout/process5"/>
+    <dgm:cxn modelId="{BDF862F7-5039-4F8A-ABA8-263CF7D180B1}" type="presOf" srcId="{4EB5DBBE-DCE8-483E-B87F-89C8099CCBEE}" destId="{BD41C635-399D-48C1-AB41-61B6E007F871}" srcOrd="1" destOrd="0" presId="urn:microsoft.com/office/officeart/2005/8/layout/process5"/>
+    <dgm:cxn modelId="{711B84A2-8E96-41B3-BDF7-9EA9E023D792}" type="presOf" srcId="{1E2C23EF-CAAF-4E2F-9004-5E6F8BE52971}" destId="{C93E592C-9798-4ACE-92C8-6F50D638F15B}" srcOrd="0" destOrd="0" presId="urn:microsoft.com/office/officeart/2005/8/layout/process5"/>
+    <dgm:cxn modelId="{99BD845D-C311-4DB1-B982-03AD5CF83431}" srcId="{1D2D40FC-672F-44DF-BBC1-1651DC0627AB}" destId="{15D6624B-5693-4B81-B217-507BC36812D9}" srcOrd="0" destOrd="0" parTransId="{E56F658E-4D93-47D2-8E70-556A4CC98E47}" sibTransId="{F5582CBA-0A42-4797-8211-5E2D720238C2}"/>
+    <dgm:cxn modelId="{6E6215C2-FCA9-415A-AF24-8886CEA69D5D}" srcId="{1D2D40FC-672F-44DF-BBC1-1651DC0627AB}" destId="{30BC2853-D363-40F3-AEDC-44F868D0FBEB}" srcOrd="1" destOrd="0" parTransId="{8C6B76F9-BD3C-4F84-AF3B-631E85FD1A46}" sibTransId="{8D55B200-50F3-43C0-99F5-291E1E11E5CF}"/>
+    <dgm:cxn modelId="{40B037E7-5D0B-4960-A791-83CF5D394599}" type="presOf" srcId="{F5582CBA-0A42-4797-8211-5E2D720238C2}" destId="{77BF6F8E-91B4-453C-9BC3-C37446874CFF}" srcOrd="1" destOrd="0" presId="urn:microsoft.com/office/officeart/2005/8/layout/process5"/>
+    <dgm:cxn modelId="{40B583C0-97E9-4025-AEE0-25FB7FE89697}" srcId="{1D2D40FC-672F-44DF-BBC1-1651DC0627AB}" destId="{2356175F-2237-4D41-A1E6-1D1072CBCE20}" srcOrd="3" destOrd="0" parTransId="{1D36CDB5-4029-4E2C-A150-A35A3218EB50}" sibTransId="{EC9F1E20-F065-4BDF-9BE9-EDCB4BC9E408}"/>
+    <dgm:cxn modelId="{3365CBA8-5D3E-438F-BA3D-92CD129E2224}" type="presOf" srcId="{F5582CBA-0A42-4797-8211-5E2D720238C2}" destId="{F5924F81-9C6A-4A0A-BFE6-B829EEF86B90}" srcOrd="0" destOrd="0" presId="urn:microsoft.com/office/officeart/2005/8/layout/process5"/>
+    <dgm:cxn modelId="{06A650A2-664B-441D-9E60-882589302499}" type="presOf" srcId="{1D2D40FC-672F-44DF-BBC1-1651DC0627AB}" destId="{F6A45DB5-5EC3-4C64-961E-1082280B54DC}" srcOrd="0" destOrd="0" presId="urn:microsoft.com/office/officeart/2005/8/layout/process5"/>
+    <dgm:cxn modelId="{7F57D4A2-9B02-4BFA-B6BD-56235C61F267}" srcId="{1D2D40FC-672F-44DF-BBC1-1651DC0627AB}" destId="{ECB04812-3440-4E3D-9928-E4F563B7540B}" srcOrd="2" destOrd="0" parTransId="{FEEE8FDD-333A-4FFE-93F8-DC00E1DD4026}" sibTransId="{4EB5DBBE-DCE8-483E-B87F-89C8099CCBEE}"/>
+    <dgm:cxn modelId="{5A790FF0-C878-4647-B659-D24501F7D6A8}" type="presOf" srcId="{EC9F1E20-F065-4BDF-9BE9-EDCB4BC9E408}" destId="{3A7B5425-ACA3-4182-8046-59D40198B5A5}" srcOrd="1" destOrd="0" presId="urn:microsoft.com/office/officeart/2005/8/layout/process5"/>
+    <dgm:cxn modelId="{191F2EE5-41C0-4705-A65A-272EDCEE1F0C}" type="presOf" srcId="{8D55B200-50F3-43C0-99F5-291E1E11E5CF}" destId="{12E600D5-D9F9-4334-A949-60E249ED70E2}" srcOrd="0" destOrd="0" presId="urn:microsoft.com/office/officeart/2005/8/layout/process5"/>
+    <dgm:cxn modelId="{EE7AD2E4-416E-4FA5-B1E2-B6362ADD954A}" type="presOf" srcId="{2356175F-2237-4D41-A1E6-1D1072CBCE20}" destId="{07B860F2-B51C-4120-B320-15A3C6B61E6C}" srcOrd="0" destOrd="0" presId="urn:microsoft.com/office/officeart/2005/8/layout/process5"/>
+    <dgm:cxn modelId="{51595972-A18C-44FA-B63A-41A75B7B2628}" type="presOf" srcId="{4EB5DBBE-DCE8-483E-B87F-89C8099CCBEE}" destId="{390FD976-A5C1-4178-ABD7-7DCE600E2744}" srcOrd="0" destOrd="0" presId="urn:microsoft.com/office/officeart/2005/8/layout/process5"/>
+    <dgm:cxn modelId="{C8B1EBC0-8A7B-4246-BD05-E09A5EDD46DF}" type="presOf" srcId="{8D55B200-50F3-43C0-99F5-291E1E11E5CF}" destId="{EA52D8F3-737A-4A40-844C-F2114CFF3DD4}" srcOrd="1" destOrd="0" presId="urn:microsoft.com/office/officeart/2005/8/layout/process5"/>
     <dgm:cxn modelId="{99B63C5C-48F2-4937-A5E8-F1373869CBD8}" srcId="{1D2D40FC-672F-44DF-BBC1-1651DC0627AB}" destId="{1E2C23EF-CAAF-4E2F-9004-5E6F8BE52971}" srcOrd="4" destOrd="0" parTransId="{2C04F958-A99D-4AC3-BE85-2CEDB35D65CA}" sibTransId="{ECD9B2B3-1E5E-4C33-997F-E34389155065}"/>
-    <dgm:cxn modelId="{40B583C0-97E9-4025-AEE0-25FB7FE89697}" srcId="{1D2D40FC-672F-44DF-BBC1-1651DC0627AB}" destId="{2356175F-2237-4D41-A1E6-1D1072CBCE20}" srcOrd="3" destOrd="0" parTransId="{1D36CDB5-4029-4E2C-A150-A35A3218EB50}" sibTransId="{EC9F1E20-F065-4BDF-9BE9-EDCB4BC9E408}"/>
-    <dgm:cxn modelId="{1766DC24-1797-43A2-AECF-DF56CE4ADFD3}" type="presOf" srcId="{4EB5DBBE-DCE8-483E-B87F-89C8099CCBEE}" destId="{390FD976-A5C1-4178-ABD7-7DCE600E2744}" srcOrd="0" destOrd="0" presId="urn:microsoft.com/office/officeart/2005/8/layout/process5"/>
-    <dgm:cxn modelId="{0CACEF12-88BE-4B3B-87F2-2000A94A2049}" type="presOf" srcId="{1D2D40FC-672F-44DF-BBC1-1651DC0627AB}" destId="{F6A45DB5-5EC3-4C64-961E-1082280B54DC}" srcOrd="0" destOrd="0" presId="urn:microsoft.com/office/officeart/2005/8/layout/process5"/>
-    <dgm:cxn modelId="{E1D88428-6C1E-4AEF-92EC-EAA5EF0DB21A}" type="presOf" srcId="{2356175F-2237-4D41-A1E6-1D1072CBCE20}" destId="{07B860F2-B51C-4120-B320-15A3C6B61E6C}" srcOrd="0" destOrd="0" presId="urn:microsoft.com/office/officeart/2005/8/layout/process5"/>
-    <dgm:cxn modelId="{56542D3C-E1D0-4468-B094-4528AAACA51B}" type="presOf" srcId="{8D55B200-50F3-43C0-99F5-291E1E11E5CF}" destId="{12E600D5-D9F9-4334-A949-60E249ED70E2}" srcOrd="0" destOrd="0" presId="urn:microsoft.com/office/officeart/2005/8/layout/process5"/>
-    <dgm:cxn modelId="{328B629B-13BC-4D11-8A0B-A2D0B78F7CF7}" type="presOf" srcId="{30BC2853-D363-40F3-AEDC-44F868D0FBEB}" destId="{2201C4AF-9549-48B9-A192-A380AFED2F7C}" srcOrd="0" destOrd="0" presId="urn:microsoft.com/office/officeart/2005/8/layout/process5"/>
-    <dgm:cxn modelId="{A3B8C292-2A95-44E0-9C48-434A2EE48D75}" type="presOf" srcId="{8D55B200-50F3-43C0-99F5-291E1E11E5CF}" destId="{EA52D8F3-737A-4A40-844C-F2114CFF3DD4}" srcOrd="1" destOrd="0" presId="urn:microsoft.com/office/officeart/2005/8/layout/process5"/>
-    <dgm:cxn modelId="{7F57D4A2-9B02-4BFA-B6BD-56235C61F267}" srcId="{1D2D40FC-672F-44DF-BBC1-1651DC0627AB}" destId="{ECB04812-3440-4E3D-9928-E4F563B7540B}" srcOrd="2" destOrd="0" parTransId="{FEEE8FDD-333A-4FFE-93F8-DC00E1DD4026}" sibTransId="{4EB5DBBE-DCE8-483E-B87F-89C8099CCBEE}"/>
-    <dgm:cxn modelId="{CB5E8BE6-2F70-475D-BE6B-9F27BD4CFA8E}" type="presOf" srcId="{15D6624B-5693-4B81-B217-507BC36812D9}" destId="{B5145141-19DE-43D6-BA90-2A30941ABD4E}" srcOrd="0" destOrd="0" presId="urn:microsoft.com/office/officeart/2005/8/layout/process5"/>
-    <dgm:cxn modelId="{A8310313-ACF9-42F7-9EAF-CC65AF677FD9}" type="presOf" srcId="{1E2C23EF-CAAF-4E2F-9004-5E6F8BE52971}" destId="{C93E592C-9798-4ACE-92C8-6F50D638F15B}" srcOrd="0" destOrd="0" presId="urn:microsoft.com/office/officeart/2005/8/layout/process5"/>
-    <dgm:cxn modelId="{B59A43DC-D436-4181-807E-9387ED0E4A62}" type="presOf" srcId="{EC9F1E20-F065-4BDF-9BE9-EDCB4BC9E408}" destId="{CDF37ACB-DED0-446D-B1E2-338040FBB106}" srcOrd="0" destOrd="0" presId="urn:microsoft.com/office/officeart/2005/8/layout/process5"/>
-    <dgm:cxn modelId="{6E6215C2-FCA9-415A-AF24-8886CEA69D5D}" srcId="{1D2D40FC-672F-44DF-BBC1-1651DC0627AB}" destId="{30BC2853-D363-40F3-AEDC-44F868D0FBEB}" srcOrd="1" destOrd="0" parTransId="{8C6B76F9-BD3C-4F84-AF3B-631E85FD1A46}" sibTransId="{8D55B200-50F3-43C0-99F5-291E1E11E5CF}"/>
-    <dgm:cxn modelId="{95107006-E90C-48CF-9D56-6CD6FA7DA83C}" type="presOf" srcId="{F5582CBA-0A42-4797-8211-5E2D720238C2}" destId="{77BF6F8E-91B4-453C-9BC3-C37446874CFF}" srcOrd="1" destOrd="0" presId="urn:microsoft.com/office/officeart/2005/8/layout/process5"/>
-    <dgm:cxn modelId="{63CFAED1-497B-4E6F-B9F1-AE3266BBC0CF}" type="presOf" srcId="{F5582CBA-0A42-4797-8211-5E2D720238C2}" destId="{F5924F81-9C6A-4A0A-BFE6-B829EEF86B90}" srcOrd="0" destOrd="0" presId="urn:microsoft.com/office/officeart/2005/8/layout/process5"/>
-    <dgm:cxn modelId="{99BD845D-C311-4DB1-B982-03AD5CF83431}" srcId="{1D2D40FC-672F-44DF-BBC1-1651DC0627AB}" destId="{15D6624B-5693-4B81-B217-507BC36812D9}" srcOrd="0" destOrd="0" parTransId="{E56F658E-4D93-47D2-8E70-556A4CC98E47}" sibTransId="{F5582CBA-0A42-4797-8211-5E2D720238C2}"/>
-    <dgm:cxn modelId="{8540C9DB-946A-4280-9F37-AE208C2C94D5}" type="presOf" srcId="{4EB5DBBE-DCE8-483E-B87F-89C8099CCBEE}" destId="{BD41C635-399D-48C1-AB41-61B6E007F871}" srcOrd="1" destOrd="0" presId="urn:microsoft.com/office/officeart/2005/8/layout/process5"/>
-    <dgm:cxn modelId="{3E82CD55-A2C1-4BEC-AECE-A4A61BADB661}" type="presOf" srcId="{ECB04812-3440-4E3D-9928-E4F563B7540B}" destId="{948A004A-B981-46ED-98B4-0146F9558DC4}" srcOrd="0" destOrd="0" presId="urn:microsoft.com/office/officeart/2005/8/layout/process5"/>
-    <dgm:cxn modelId="{8FC1935D-D8C3-40CA-B02F-734D8A53E282}" type="presOf" srcId="{EC9F1E20-F065-4BDF-9BE9-EDCB4BC9E408}" destId="{3A7B5425-ACA3-4182-8046-59D40198B5A5}" srcOrd="1" destOrd="0" presId="urn:microsoft.com/office/officeart/2005/8/layout/process5"/>
-    <dgm:cxn modelId="{367364DA-204B-4D56-9230-9AFCAB1F5B81}" type="presParOf" srcId="{F6A45DB5-5EC3-4C64-961E-1082280B54DC}" destId="{B5145141-19DE-43D6-BA90-2A30941ABD4E}" srcOrd="0" destOrd="0" presId="urn:microsoft.com/office/officeart/2005/8/layout/process5"/>
-    <dgm:cxn modelId="{A2684BC1-EAEB-4179-B7D4-8C7B876F8D1B}" type="presParOf" srcId="{F6A45DB5-5EC3-4C64-961E-1082280B54DC}" destId="{F5924F81-9C6A-4A0A-BFE6-B829EEF86B90}" srcOrd="1" destOrd="0" presId="urn:microsoft.com/office/officeart/2005/8/layout/process5"/>
-    <dgm:cxn modelId="{5458FE76-5DF0-4BA5-BC6F-FAAD58C6F78F}" type="presParOf" srcId="{F5924F81-9C6A-4A0A-BFE6-B829EEF86B90}" destId="{77BF6F8E-91B4-453C-9BC3-C37446874CFF}" srcOrd="0" destOrd="0" presId="urn:microsoft.com/office/officeart/2005/8/layout/process5"/>
-    <dgm:cxn modelId="{DC110BB9-0641-46EB-B34C-64B07007A775}" type="presParOf" srcId="{F6A45DB5-5EC3-4C64-961E-1082280B54DC}" destId="{2201C4AF-9549-48B9-A192-A380AFED2F7C}" srcOrd="2" destOrd="0" presId="urn:microsoft.com/office/officeart/2005/8/layout/process5"/>
-    <dgm:cxn modelId="{F775EC1F-C1F4-4FA7-B6C5-66D002DE6CA2}" type="presParOf" srcId="{F6A45DB5-5EC3-4C64-961E-1082280B54DC}" destId="{12E600D5-D9F9-4334-A949-60E249ED70E2}" srcOrd="3" destOrd="0" presId="urn:microsoft.com/office/officeart/2005/8/layout/process5"/>
-    <dgm:cxn modelId="{30F15BFF-74F8-4D2F-9D44-7CC4839EBAC6}" type="presParOf" srcId="{12E600D5-D9F9-4334-A949-60E249ED70E2}" destId="{EA52D8F3-737A-4A40-844C-F2114CFF3DD4}" srcOrd="0" destOrd="0" presId="urn:microsoft.com/office/officeart/2005/8/layout/process5"/>
-    <dgm:cxn modelId="{00DA965F-5711-4DB8-B090-5FE263C32970}" type="presParOf" srcId="{F6A45DB5-5EC3-4C64-961E-1082280B54DC}" destId="{948A004A-B981-46ED-98B4-0146F9558DC4}" srcOrd="4" destOrd="0" presId="urn:microsoft.com/office/officeart/2005/8/layout/process5"/>
-    <dgm:cxn modelId="{384A13F3-8942-4BD3-BB17-F9D882C13304}" type="presParOf" srcId="{F6A45DB5-5EC3-4C64-961E-1082280B54DC}" destId="{390FD976-A5C1-4178-ABD7-7DCE600E2744}" srcOrd="5" destOrd="0" presId="urn:microsoft.com/office/officeart/2005/8/layout/process5"/>
-    <dgm:cxn modelId="{23CE2453-D61F-42F0-879A-96ACF1193954}" type="presParOf" srcId="{390FD976-A5C1-4178-ABD7-7DCE600E2744}" destId="{BD41C635-399D-48C1-AB41-61B6E007F871}" srcOrd="0" destOrd="0" presId="urn:microsoft.com/office/officeart/2005/8/layout/process5"/>
-    <dgm:cxn modelId="{A65544F7-01E5-4DBC-B1DD-A3194926169C}" type="presParOf" srcId="{F6A45DB5-5EC3-4C64-961E-1082280B54DC}" destId="{07B860F2-B51C-4120-B320-15A3C6B61E6C}" srcOrd="6" destOrd="0" presId="urn:microsoft.com/office/officeart/2005/8/layout/process5"/>
-    <dgm:cxn modelId="{438FFF7A-EA93-40B6-A9B2-F2D04D2302B5}" type="presParOf" srcId="{F6A45DB5-5EC3-4C64-961E-1082280B54DC}" destId="{CDF37ACB-DED0-446D-B1E2-338040FBB106}" srcOrd="7" destOrd="0" presId="urn:microsoft.com/office/officeart/2005/8/layout/process5"/>
-    <dgm:cxn modelId="{A135D81C-9E7B-4F06-93FF-E38C6F21760F}" type="presParOf" srcId="{CDF37ACB-DED0-446D-B1E2-338040FBB106}" destId="{3A7B5425-ACA3-4182-8046-59D40198B5A5}" srcOrd="0" destOrd="0" presId="urn:microsoft.com/office/officeart/2005/8/layout/process5"/>
-    <dgm:cxn modelId="{BEDC3BFB-540A-463A-8C46-A69A1046987A}" type="presParOf" srcId="{F6A45DB5-5EC3-4C64-961E-1082280B54DC}" destId="{C93E592C-9798-4ACE-92C8-6F50D638F15B}" srcOrd="8" destOrd="0" presId="urn:microsoft.com/office/officeart/2005/8/layout/process5"/>
+    <dgm:cxn modelId="{1616F68F-BA27-49C0-B0F9-8A91B5CF69F2}" type="presOf" srcId="{30BC2853-D363-40F3-AEDC-44F868D0FBEB}" destId="{2201C4AF-9549-48B9-A192-A380AFED2F7C}" srcOrd="0" destOrd="0" presId="urn:microsoft.com/office/officeart/2005/8/layout/process5"/>
+    <dgm:cxn modelId="{EF9783BF-0465-489C-A6A6-BF52326096A0}" type="presOf" srcId="{EC9F1E20-F065-4BDF-9BE9-EDCB4BC9E408}" destId="{CDF37ACB-DED0-446D-B1E2-338040FBB106}" srcOrd="0" destOrd="0" presId="urn:microsoft.com/office/officeart/2005/8/layout/process5"/>
+    <dgm:cxn modelId="{6A547B44-011F-492D-B1F2-CB63F86C9F14}" type="presOf" srcId="{ECB04812-3440-4E3D-9928-E4F563B7540B}" destId="{948A004A-B981-46ED-98B4-0146F9558DC4}" srcOrd="0" destOrd="0" presId="urn:microsoft.com/office/officeart/2005/8/layout/process5"/>
+    <dgm:cxn modelId="{2D57F175-BE82-4AD1-B360-1AEBE76198AB}" type="presParOf" srcId="{F6A45DB5-5EC3-4C64-961E-1082280B54DC}" destId="{B5145141-19DE-43D6-BA90-2A30941ABD4E}" srcOrd="0" destOrd="0" presId="urn:microsoft.com/office/officeart/2005/8/layout/process5"/>
+    <dgm:cxn modelId="{B40644B4-D4BA-43EA-A497-ECD870C40A9A}" type="presParOf" srcId="{F6A45DB5-5EC3-4C64-961E-1082280B54DC}" destId="{F5924F81-9C6A-4A0A-BFE6-B829EEF86B90}" srcOrd="1" destOrd="0" presId="urn:microsoft.com/office/officeart/2005/8/layout/process5"/>
+    <dgm:cxn modelId="{AD5E6038-3212-4F54-99D5-0E3399E3C2B3}" type="presParOf" srcId="{F5924F81-9C6A-4A0A-BFE6-B829EEF86B90}" destId="{77BF6F8E-91B4-453C-9BC3-C37446874CFF}" srcOrd="0" destOrd="0" presId="urn:microsoft.com/office/officeart/2005/8/layout/process5"/>
+    <dgm:cxn modelId="{67425E1A-1E5A-4E81-AB9D-166C2849DEE3}" type="presParOf" srcId="{F6A45DB5-5EC3-4C64-961E-1082280B54DC}" destId="{2201C4AF-9549-48B9-A192-A380AFED2F7C}" srcOrd="2" destOrd="0" presId="urn:microsoft.com/office/officeart/2005/8/layout/process5"/>
+    <dgm:cxn modelId="{3AEE5C01-A5D0-433A-97CE-1D594C67CFB5}" type="presParOf" srcId="{F6A45DB5-5EC3-4C64-961E-1082280B54DC}" destId="{12E600D5-D9F9-4334-A949-60E249ED70E2}" srcOrd="3" destOrd="0" presId="urn:microsoft.com/office/officeart/2005/8/layout/process5"/>
+    <dgm:cxn modelId="{45BFF28D-92C1-4CE0-BCEA-54C7CA7A52F0}" type="presParOf" srcId="{12E600D5-D9F9-4334-A949-60E249ED70E2}" destId="{EA52D8F3-737A-4A40-844C-F2114CFF3DD4}" srcOrd="0" destOrd="0" presId="urn:microsoft.com/office/officeart/2005/8/layout/process5"/>
+    <dgm:cxn modelId="{060644AC-250B-4931-BB85-A8949B0FEF55}" type="presParOf" srcId="{F6A45DB5-5EC3-4C64-961E-1082280B54DC}" destId="{948A004A-B981-46ED-98B4-0146F9558DC4}" srcOrd="4" destOrd="0" presId="urn:microsoft.com/office/officeart/2005/8/layout/process5"/>
+    <dgm:cxn modelId="{4B97B11F-727D-4A3A-B313-53470F4BB573}" type="presParOf" srcId="{F6A45DB5-5EC3-4C64-961E-1082280B54DC}" destId="{390FD976-A5C1-4178-ABD7-7DCE600E2744}" srcOrd="5" destOrd="0" presId="urn:microsoft.com/office/officeart/2005/8/layout/process5"/>
+    <dgm:cxn modelId="{B966F2B9-51BA-4F35-942D-7143C1844D56}" type="presParOf" srcId="{390FD976-A5C1-4178-ABD7-7DCE600E2744}" destId="{BD41C635-399D-48C1-AB41-61B6E007F871}" srcOrd="0" destOrd="0" presId="urn:microsoft.com/office/officeart/2005/8/layout/process5"/>
+    <dgm:cxn modelId="{4BF04609-EF6F-4953-A5E3-8D73CF8A67BF}" type="presParOf" srcId="{F6A45DB5-5EC3-4C64-961E-1082280B54DC}" destId="{07B860F2-B51C-4120-B320-15A3C6B61E6C}" srcOrd="6" destOrd="0" presId="urn:microsoft.com/office/officeart/2005/8/layout/process5"/>
+    <dgm:cxn modelId="{8DC57D3E-EBBC-4664-B080-E9F3084BE414}" type="presParOf" srcId="{F6A45DB5-5EC3-4C64-961E-1082280B54DC}" destId="{CDF37ACB-DED0-446D-B1E2-338040FBB106}" srcOrd="7" destOrd="0" presId="urn:microsoft.com/office/officeart/2005/8/layout/process5"/>
+    <dgm:cxn modelId="{107A0067-6060-4D24-8B24-3E34500BE172}" type="presParOf" srcId="{CDF37ACB-DED0-446D-B1E2-338040FBB106}" destId="{3A7B5425-ACA3-4182-8046-59D40198B5A5}" srcOrd="0" destOrd="0" presId="urn:microsoft.com/office/officeart/2005/8/layout/process5"/>
+    <dgm:cxn modelId="{EAEFFF7C-0827-4121-ADA7-CEAF33BD940A}" type="presParOf" srcId="{F6A45DB5-5EC3-4C64-961E-1082280B54DC}" destId="{C93E592C-9798-4ACE-92C8-6F50D638F15B}" srcOrd="8" destOrd="0" presId="urn:microsoft.com/office/officeart/2005/8/layout/process5"/>
   </dgm:cxnLst>
   <dgm:bg/>
   <dgm:whole/>
@@ -3153,7 +3272,7 @@
           <a:p>
             <a:fld id="{6CA12BF8-AA6F-451D-810D-0D062F814E81}" type="datetimeFigureOut">
               <a:rPr lang="fr-FR" smtClean="0"/>
-              <a:t>21/02/2016</a:t>
+              <a:t>24/02/2016</a:t>
             </a:fld>
             <a:endParaRPr lang="fr-FR"/>
           </a:p>
@@ -3312,7 +3431,7 @@
           <a:p>
             <a:fld id="{3D9E8408-4EF2-4CC3-8C07-D969A2CE9A23}" type="slidenum">
               <a:rPr lang="fr-FR" smtClean="0"/>
-              <a:t>‹#›</a:t>
+              <a:t>‹N°›</a:t>
             </a:fld>
             <a:endParaRPr lang="fr-FR"/>
           </a:p>
@@ -3505,6 +3624,426 @@
 </p:notes>
 </file>
 
+<file path=ppt/notesSlides/notesSlide2.xml><?xml version="1.0" encoding="utf-8"?>
+<p:notes xmlns:a="http://schemas.openxmlformats.org/drawingml/2006/main" xmlns:r="http://schemas.openxmlformats.org/officeDocument/2006/relationships" xmlns:p="http://schemas.openxmlformats.org/presentationml/2006/main">
+  <p:cSld>
+    <p:spTree>
+      <p:nvGrpSpPr>
+        <p:cNvPr id="1" name=""/>
+        <p:cNvGrpSpPr/>
+        <p:nvPr/>
+      </p:nvGrpSpPr>
+      <p:grpSpPr>
+        <a:xfrm>
+          <a:off x="0" y="0"/>
+          <a:ext cx="0" cy="0"/>
+          <a:chOff x="0" y="0"/>
+          <a:chExt cx="0" cy="0"/>
+        </a:xfrm>
+      </p:grpSpPr>
+      <p:sp>
+        <p:nvSpPr>
+          <p:cNvPr id="2" name="Espace réservé de l'image des diapositives 1"/>
+          <p:cNvSpPr>
+            <a:spLocks noGrp="1" noRot="1" noChangeAspect="1"/>
+          </p:cNvSpPr>
+          <p:nvPr>
+            <p:ph type="sldImg"/>
+          </p:nvPr>
+        </p:nvSpPr>
+        <p:spPr/>
+      </p:sp>
+      <p:sp>
+        <p:nvSpPr>
+          <p:cNvPr id="3" name="Espace réservé des commentaires 2"/>
+          <p:cNvSpPr>
+            <a:spLocks noGrp="1"/>
+          </p:cNvSpPr>
+          <p:nvPr>
+            <p:ph type="body" idx="1"/>
+          </p:nvPr>
+        </p:nvSpPr>
+        <p:spPr/>
+        <p:txBody>
+          <a:bodyPr/>
+          <a:lstStyle/>
+          <a:p>
+            <a:endParaRPr lang="fr-FR" dirty="0"/>
+          </a:p>
+        </p:txBody>
+      </p:sp>
+      <p:sp>
+        <p:nvSpPr>
+          <p:cNvPr id="4" name="Espace réservé du numéro de diapositive 3"/>
+          <p:cNvSpPr>
+            <a:spLocks noGrp="1"/>
+          </p:cNvSpPr>
+          <p:nvPr>
+            <p:ph type="sldNum" sz="quarter" idx="10"/>
+          </p:nvPr>
+        </p:nvSpPr>
+        <p:spPr/>
+        <p:txBody>
+          <a:bodyPr/>
+          <a:lstStyle/>
+          <a:p>
+            <a:fld id="{3D9E8408-4EF2-4CC3-8C07-D969A2CE9A23}" type="slidenum">
+              <a:rPr lang="fr-FR" smtClean="0"/>
+              <a:t>14</a:t>
+            </a:fld>
+            <a:endParaRPr lang="fr-FR"/>
+          </a:p>
+        </p:txBody>
+      </p:sp>
+    </p:spTree>
+    <p:extLst>
+      <p:ext uri="{BB962C8B-B14F-4D97-AF65-F5344CB8AC3E}">
+        <p14:creationId xmlns:p14="http://schemas.microsoft.com/office/powerpoint/2010/main" val="2527877910"/>
+      </p:ext>
+    </p:extLst>
+  </p:cSld>
+  <p:clrMapOvr>
+    <a:masterClrMapping/>
+  </p:clrMapOvr>
+</p:notes>
+</file>
+
+<file path=ppt/notesSlides/notesSlide3.xml><?xml version="1.0" encoding="utf-8"?>
+<p:notes xmlns:a="http://schemas.openxmlformats.org/drawingml/2006/main" xmlns:r="http://schemas.openxmlformats.org/officeDocument/2006/relationships" xmlns:p="http://schemas.openxmlformats.org/presentationml/2006/main">
+  <p:cSld>
+    <p:spTree>
+      <p:nvGrpSpPr>
+        <p:cNvPr id="1" name=""/>
+        <p:cNvGrpSpPr/>
+        <p:nvPr/>
+      </p:nvGrpSpPr>
+      <p:grpSpPr>
+        <a:xfrm>
+          <a:off x="0" y="0"/>
+          <a:ext cx="0" cy="0"/>
+          <a:chOff x="0" y="0"/>
+          <a:chExt cx="0" cy="0"/>
+        </a:xfrm>
+      </p:grpSpPr>
+      <p:sp>
+        <p:nvSpPr>
+          <p:cNvPr id="2" name="Espace réservé de l'image des diapositives 1"/>
+          <p:cNvSpPr>
+            <a:spLocks noGrp="1" noRot="1" noChangeAspect="1"/>
+          </p:cNvSpPr>
+          <p:nvPr>
+            <p:ph type="sldImg"/>
+          </p:nvPr>
+        </p:nvSpPr>
+        <p:spPr/>
+      </p:sp>
+      <p:sp>
+        <p:nvSpPr>
+          <p:cNvPr id="3" name="Espace réservé des commentaires 2"/>
+          <p:cNvSpPr>
+            <a:spLocks noGrp="1"/>
+          </p:cNvSpPr>
+          <p:nvPr>
+            <p:ph type="body" idx="1"/>
+          </p:nvPr>
+        </p:nvSpPr>
+        <p:spPr/>
+        <p:txBody>
+          <a:bodyPr/>
+          <a:lstStyle/>
+          <a:p>
+            <a:endParaRPr lang="fr-FR" dirty="0"/>
+          </a:p>
+        </p:txBody>
+      </p:sp>
+      <p:sp>
+        <p:nvSpPr>
+          <p:cNvPr id="4" name="Espace réservé du numéro de diapositive 3"/>
+          <p:cNvSpPr>
+            <a:spLocks noGrp="1"/>
+          </p:cNvSpPr>
+          <p:nvPr>
+            <p:ph type="sldNum" sz="quarter" idx="10"/>
+          </p:nvPr>
+        </p:nvSpPr>
+        <p:spPr/>
+        <p:txBody>
+          <a:bodyPr/>
+          <a:lstStyle/>
+          <a:p>
+            <a:fld id="{3D9E8408-4EF2-4CC3-8C07-D969A2CE9A23}" type="slidenum">
+              <a:rPr lang="fr-FR" smtClean="0"/>
+              <a:t>15</a:t>
+            </a:fld>
+            <a:endParaRPr lang="fr-FR"/>
+          </a:p>
+        </p:txBody>
+      </p:sp>
+    </p:spTree>
+    <p:extLst>
+      <p:ext uri="{BB962C8B-B14F-4D97-AF65-F5344CB8AC3E}">
+        <p14:creationId xmlns:p14="http://schemas.microsoft.com/office/powerpoint/2010/main" val="835060445"/>
+      </p:ext>
+    </p:extLst>
+  </p:cSld>
+  <p:clrMapOvr>
+    <a:masterClrMapping/>
+  </p:clrMapOvr>
+</p:notes>
+</file>
+
+<file path=ppt/notesSlides/notesSlide4.xml><?xml version="1.0" encoding="utf-8"?>
+<p:notes xmlns:a="http://schemas.openxmlformats.org/drawingml/2006/main" xmlns:r="http://schemas.openxmlformats.org/officeDocument/2006/relationships" xmlns:p="http://schemas.openxmlformats.org/presentationml/2006/main">
+  <p:cSld>
+    <p:spTree>
+      <p:nvGrpSpPr>
+        <p:cNvPr id="1" name=""/>
+        <p:cNvGrpSpPr/>
+        <p:nvPr/>
+      </p:nvGrpSpPr>
+      <p:grpSpPr>
+        <a:xfrm>
+          <a:off x="0" y="0"/>
+          <a:ext cx="0" cy="0"/>
+          <a:chOff x="0" y="0"/>
+          <a:chExt cx="0" cy="0"/>
+        </a:xfrm>
+      </p:grpSpPr>
+      <p:sp>
+        <p:nvSpPr>
+          <p:cNvPr id="2" name="Espace réservé de l'image des diapositives 1"/>
+          <p:cNvSpPr>
+            <a:spLocks noGrp="1" noRot="1" noChangeAspect="1"/>
+          </p:cNvSpPr>
+          <p:nvPr>
+            <p:ph type="sldImg"/>
+          </p:nvPr>
+        </p:nvSpPr>
+        <p:spPr/>
+      </p:sp>
+      <p:sp>
+        <p:nvSpPr>
+          <p:cNvPr id="3" name="Espace réservé des commentaires 2"/>
+          <p:cNvSpPr>
+            <a:spLocks noGrp="1"/>
+          </p:cNvSpPr>
+          <p:nvPr>
+            <p:ph type="body" idx="1"/>
+          </p:nvPr>
+        </p:nvSpPr>
+        <p:spPr/>
+        <p:txBody>
+          <a:bodyPr/>
+          <a:lstStyle/>
+          <a:p>
+            <a:endParaRPr lang="fr-FR" dirty="0"/>
+          </a:p>
+        </p:txBody>
+      </p:sp>
+      <p:sp>
+        <p:nvSpPr>
+          <p:cNvPr id="4" name="Espace réservé du numéro de diapositive 3"/>
+          <p:cNvSpPr>
+            <a:spLocks noGrp="1"/>
+          </p:cNvSpPr>
+          <p:nvPr>
+            <p:ph type="sldNum" sz="quarter" idx="10"/>
+          </p:nvPr>
+        </p:nvSpPr>
+        <p:spPr/>
+        <p:txBody>
+          <a:bodyPr/>
+          <a:lstStyle/>
+          <a:p>
+            <a:fld id="{3D9E8408-4EF2-4CC3-8C07-D969A2CE9A23}" type="slidenum">
+              <a:rPr lang="fr-FR" smtClean="0"/>
+              <a:t>16</a:t>
+            </a:fld>
+            <a:endParaRPr lang="fr-FR"/>
+          </a:p>
+        </p:txBody>
+      </p:sp>
+    </p:spTree>
+    <p:extLst>
+      <p:ext uri="{BB962C8B-B14F-4D97-AF65-F5344CB8AC3E}">
+        <p14:creationId xmlns:p14="http://schemas.microsoft.com/office/powerpoint/2010/main" val="1493789863"/>
+      </p:ext>
+    </p:extLst>
+  </p:cSld>
+  <p:clrMapOvr>
+    <a:masterClrMapping/>
+  </p:clrMapOvr>
+</p:notes>
+</file>
+
+<file path=ppt/notesSlides/notesSlide5.xml><?xml version="1.0" encoding="utf-8"?>
+<p:notes xmlns:a="http://schemas.openxmlformats.org/drawingml/2006/main" xmlns:r="http://schemas.openxmlformats.org/officeDocument/2006/relationships" xmlns:p="http://schemas.openxmlformats.org/presentationml/2006/main">
+  <p:cSld>
+    <p:spTree>
+      <p:nvGrpSpPr>
+        <p:cNvPr id="1" name=""/>
+        <p:cNvGrpSpPr/>
+        <p:nvPr/>
+      </p:nvGrpSpPr>
+      <p:grpSpPr>
+        <a:xfrm>
+          <a:off x="0" y="0"/>
+          <a:ext cx="0" cy="0"/>
+          <a:chOff x="0" y="0"/>
+          <a:chExt cx="0" cy="0"/>
+        </a:xfrm>
+      </p:grpSpPr>
+      <p:sp>
+        <p:nvSpPr>
+          <p:cNvPr id="2" name="Espace réservé de l'image des diapositives 1"/>
+          <p:cNvSpPr>
+            <a:spLocks noGrp="1" noRot="1" noChangeAspect="1"/>
+          </p:cNvSpPr>
+          <p:nvPr>
+            <p:ph type="sldImg"/>
+          </p:nvPr>
+        </p:nvSpPr>
+        <p:spPr/>
+      </p:sp>
+      <p:sp>
+        <p:nvSpPr>
+          <p:cNvPr id="3" name="Espace réservé des commentaires 2"/>
+          <p:cNvSpPr>
+            <a:spLocks noGrp="1"/>
+          </p:cNvSpPr>
+          <p:nvPr>
+            <p:ph type="body" idx="1"/>
+          </p:nvPr>
+        </p:nvSpPr>
+        <p:spPr/>
+        <p:txBody>
+          <a:bodyPr/>
+          <a:lstStyle/>
+          <a:p>
+            <a:endParaRPr lang="fr-FR" dirty="0"/>
+          </a:p>
+        </p:txBody>
+      </p:sp>
+      <p:sp>
+        <p:nvSpPr>
+          <p:cNvPr id="4" name="Espace réservé du numéro de diapositive 3"/>
+          <p:cNvSpPr>
+            <a:spLocks noGrp="1"/>
+          </p:cNvSpPr>
+          <p:nvPr>
+            <p:ph type="sldNum" sz="quarter" idx="10"/>
+          </p:nvPr>
+        </p:nvSpPr>
+        <p:spPr/>
+        <p:txBody>
+          <a:bodyPr/>
+          <a:lstStyle/>
+          <a:p>
+            <a:fld id="{3D9E8408-4EF2-4CC3-8C07-D969A2CE9A23}" type="slidenum">
+              <a:rPr lang="fr-FR" smtClean="0"/>
+              <a:t>17</a:t>
+            </a:fld>
+            <a:endParaRPr lang="fr-FR"/>
+          </a:p>
+        </p:txBody>
+      </p:sp>
+    </p:spTree>
+    <p:extLst>
+      <p:ext uri="{BB962C8B-B14F-4D97-AF65-F5344CB8AC3E}">
+        <p14:creationId xmlns:p14="http://schemas.microsoft.com/office/powerpoint/2010/main" val="1013342947"/>
+      </p:ext>
+    </p:extLst>
+  </p:cSld>
+  <p:clrMapOvr>
+    <a:masterClrMapping/>
+  </p:clrMapOvr>
+</p:notes>
+</file>
+
+<file path=ppt/notesSlides/notesSlide6.xml><?xml version="1.0" encoding="utf-8"?>
+<p:notes xmlns:a="http://schemas.openxmlformats.org/drawingml/2006/main" xmlns:r="http://schemas.openxmlformats.org/officeDocument/2006/relationships" xmlns:p="http://schemas.openxmlformats.org/presentationml/2006/main">
+  <p:cSld>
+    <p:spTree>
+      <p:nvGrpSpPr>
+        <p:cNvPr id="1" name=""/>
+        <p:cNvGrpSpPr/>
+        <p:nvPr/>
+      </p:nvGrpSpPr>
+      <p:grpSpPr>
+        <a:xfrm>
+          <a:off x="0" y="0"/>
+          <a:ext cx="0" cy="0"/>
+          <a:chOff x="0" y="0"/>
+          <a:chExt cx="0" cy="0"/>
+        </a:xfrm>
+      </p:grpSpPr>
+      <p:sp>
+        <p:nvSpPr>
+          <p:cNvPr id="2" name="Espace réservé de l'image des diapositives 1"/>
+          <p:cNvSpPr>
+            <a:spLocks noGrp="1" noRot="1" noChangeAspect="1"/>
+          </p:cNvSpPr>
+          <p:nvPr>
+            <p:ph type="sldImg"/>
+          </p:nvPr>
+        </p:nvSpPr>
+        <p:spPr/>
+      </p:sp>
+      <p:sp>
+        <p:nvSpPr>
+          <p:cNvPr id="3" name="Espace réservé des commentaires 2"/>
+          <p:cNvSpPr>
+            <a:spLocks noGrp="1"/>
+          </p:cNvSpPr>
+          <p:nvPr>
+            <p:ph type="body" idx="1"/>
+          </p:nvPr>
+        </p:nvSpPr>
+        <p:spPr/>
+        <p:txBody>
+          <a:bodyPr/>
+          <a:lstStyle/>
+          <a:p>
+            <a:endParaRPr lang="fr-FR" dirty="0"/>
+          </a:p>
+        </p:txBody>
+      </p:sp>
+      <p:sp>
+        <p:nvSpPr>
+          <p:cNvPr id="4" name="Espace réservé du numéro de diapositive 3"/>
+          <p:cNvSpPr>
+            <a:spLocks noGrp="1"/>
+          </p:cNvSpPr>
+          <p:nvPr>
+            <p:ph type="sldNum" sz="quarter" idx="10"/>
+          </p:nvPr>
+        </p:nvSpPr>
+        <p:spPr/>
+        <p:txBody>
+          <a:bodyPr/>
+          <a:lstStyle/>
+          <a:p>
+            <a:fld id="{3D9E8408-4EF2-4CC3-8C07-D969A2CE9A23}" type="slidenum">
+              <a:rPr lang="fr-FR" smtClean="0"/>
+              <a:t>18</a:t>
+            </a:fld>
+            <a:endParaRPr lang="fr-FR"/>
+          </a:p>
+        </p:txBody>
+      </p:sp>
+    </p:spTree>
+    <p:extLst>
+      <p:ext uri="{BB962C8B-B14F-4D97-AF65-F5344CB8AC3E}">
+        <p14:creationId xmlns:p14="http://schemas.microsoft.com/office/powerpoint/2010/main" val="38263337"/>
+      </p:ext>
+    </p:extLst>
+  </p:cSld>
+  <p:clrMapOvr>
+    <a:masterClrMapping/>
+  </p:clrMapOvr>
+</p:notes>
+</file>
+
 <file path=ppt/slideLayouts/slideLayout1.xml><?xml version="1.0" encoding="utf-8"?>
 <p:sldLayout xmlns:a="http://schemas.openxmlformats.org/drawingml/2006/main" xmlns:r="http://schemas.openxmlformats.org/officeDocument/2006/relationships" xmlns:p="http://schemas.openxmlformats.org/presentationml/2006/main" showMasterSp="0" type="title" preserve="1">
   <p:cSld name="Title Slide">
@@ -4163,7 +4702,7 @@
           <a:p>
             <a:fld id="{CE695525-20C4-42BC-8844-9CE5B318A979}" type="datetime1">
               <a:rPr lang="en-US" smtClean="0"/>
-              <a:t>2/21/2016</a:t>
+              <a:t>2/24/2016</a:t>
             </a:fld>
             <a:endParaRPr lang="en-US"/>
           </a:p>
@@ -4224,7 +4763,7 @@
             <a:fld id="{B6F15528-21DE-4FAA-801E-634DDDAF4B2B}" type="slidenum">
               <a:rPr lang="en-US" smtClean="0"/>
               <a:pPr/>
-              <a:t>‹#›</a:t>
+              <a:t>‹N°›</a:t>
             </a:fld>
             <a:endParaRPr lang="en-US"/>
           </a:p>
@@ -4354,7 +4893,7 @@
           <a:p>
             <a:fld id="{085FF166-E312-4218-8480-DE90A277CECC}" type="datetime1">
               <a:rPr lang="en-US" smtClean="0"/>
-              <a:t>2/21/2016</a:t>
+              <a:t>2/24/2016</a:t>
             </a:fld>
             <a:endParaRPr lang="en-US"/>
           </a:p>
@@ -4397,7 +4936,7 @@
             <a:fld id="{B6F15528-21DE-4FAA-801E-634DDDAF4B2B}" type="slidenum">
               <a:rPr lang="en-US" smtClean="0"/>
               <a:pPr/>
-              <a:t>‹#›</a:t>
+              <a:t>‹N°›</a:t>
             </a:fld>
             <a:endParaRPr lang="en-US"/>
           </a:p>
@@ -4530,7 +5069,7 @@
           <a:p>
             <a:fld id="{91BCEE89-8E6F-41A2-AF19-17E128BC18C7}" type="datetime1">
               <a:rPr lang="en-US" smtClean="0"/>
-              <a:t>2/21/2016</a:t>
+              <a:t>2/24/2016</a:t>
             </a:fld>
             <a:endParaRPr lang="en-US"/>
           </a:p>
@@ -4573,7 +5112,7 @@
             <a:fld id="{B6F15528-21DE-4FAA-801E-634DDDAF4B2B}" type="slidenum">
               <a:rPr lang="en-US" smtClean="0"/>
               <a:pPr/>
-              <a:t>‹#›</a:t>
+              <a:t>‹N°›</a:t>
             </a:fld>
             <a:endParaRPr lang="en-US"/>
           </a:p>
@@ -4696,7 +5235,7 @@
           <a:p>
             <a:fld id="{307978DF-41EA-45F4-8CB3-313D6DB7626A}" type="datetime1">
               <a:rPr lang="en-US" smtClean="0"/>
-              <a:t>2/21/2016</a:t>
+              <a:t>2/24/2016</a:t>
             </a:fld>
             <a:endParaRPr lang="en-US"/>
           </a:p>
@@ -4739,7 +5278,7 @@
             <a:fld id="{B6F15528-21DE-4FAA-801E-634DDDAF4B2B}" type="slidenum">
               <a:rPr lang="en-US" smtClean="0"/>
               <a:pPr/>
-              <a:t>‹#›</a:t>
+              <a:t>‹N°›</a:t>
             </a:fld>
             <a:endParaRPr lang="en-US"/>
           </a:p>
@@ -4918,7 +5457,7 @@
           <a:p>
             <a:fld id="{D69C4410-7861-4331-958B-078FDABB11FF}" type="datetime1">
               <a:rPr lang="en-US" smtClean="0"/>
-              <a:t>2/21/2016</a:t>
+              <a:t>2/24/2016</a:t>
             </a:fld>
             <a:endParaRPr lang="en-US"/>
           </a:p>
@@ -4961,7 +5500,7 @@
             <a:fld id="{B6F15528-21DE-4FAA-801E-634DDDAF4B2B}" type="slidenum">
               <a:rPr lang="en-US" smtClean="0"/>
               <a:pPr/>
-              <a:t>‹#›</a:t>
+              <a:t>‹N°›</a:t>
             </a:fld>
             <a:endParaRPr lang="en-US"/>
           </a:p>
@@ -5185,7 +5724,7 @@
           <a:p>
             <a:fld id="{F742D249-6EC0-4768-A370-9E4AD6509AEF}" type="datetime1">
               <a:rPr lang="en-US" smtClean="0"/>
-              <a:t>2/21/2016</a:t>
+              <a:t>2/24/2016</a:t>
             </a:fld>
             <a:endParaRPr lang="en-US"/>
           </a:p>
@@ -5228,7 +5767,7 @@
             <a:fld id="{B6F15528-21DE-4FAA-801E-634DDDAF4B2B}" type="slidenum">
               <a:rPr lang="en-US" smtClean="0"/>
               <a:pPr/>
-              <a:t>‹#›</a:t>
+              <a:t>‹N°›</a:t>
             </a:fld>
             <a:endParaRPr lang="en-US"/>
           </a:p>
@@ -5590,7 +6129,7 @@
           <a:p>
             <a:fld id="{0B75EEA0-4071-449F-ACCC-4DCB578AE369}" type="datetime1">
               <a:rPr lang="en-US" smtClean="0"/>
-              <a:t>2/21/2016</a:t>
+              <a:t>2/24/2016</a:t>
             </a:fld>
             <a:endParaRPr lang="en-US"/>
           </a:p>
@@ -5614,7 +6153,7 @@
             <a:fld id="{B6F15528-21DE-4FAA-801E-634DDDAF4B2B}" type="slidenum">
               <a:rPr lang="en-US" smtClean="0"/>
               <a:pPr/>
-              <a:t>‹#›</a:t>
+              <a:t>‹N°›</a:t>
             </a:fld>
             <a:endParaRPr lang="en-US"/>
           </a:p>
@@ -5722,7 +6261,7 @@
           <a:p>
             <a:fld id="{6F4A1ABB-05DB-4402-8E2A-1DC5615B74CD}" type="datetime1">
               <a:rPr lang="en-US" smtClean="0"/>
-              <a:t>2/21/2016</a:t>
+              <a:t>2/24/2016</a:t>
             </a:fld>
             <a:endParaRPr lang="en-US"/>
           </a:p>
@@ -5775,7 +6314,7 @@
             <a:fld id="{B6F15528-21DE-4FAA-801E-634DDDAF4B2B}" type="slidenum">
               <a:rPr lang="en-US" smtClean="0"/>
               <a:pPr/>
-              <a:t>‹#›</a:t>
+              <a:t>‹N°›</a:t>
             </a:fld>
             <a:endParaRPr lang="en-US"/>
           </a:p>
@@ -5823,7 +6362,7 @@
           <a:p>
             <a:fld id="{C9CD4500-2883-4D69-8313-FE7156E564D6}" type="datetime1">
               <a:rPr lang="en-US" smtClean="0"/>
-              <a:t>2/21/2016</a:t>
+              <a:t>2/24/2016</a:t>
             </a:fld>
             <a:endParaRPr lang="en-US"/>
           </a:p>
@@ -5866,7 +6405,7 @@
             <a:fld id="{B6F15528-21DE-4FAA-801E-634DDDAF4B2B}" type="slidenum">
               <a:rPr lang="en-US" smtClean="0"/>
               <a:pPr/>
-              <a:t>‹#›</a:t>
+              <a:t>‹N°›</a:t>
             </a:fld>
             <a:endParaRPr lang="en-US"/>
           </a:p>
@@ -6069,7 +6608,7 @@
           <a:p>
             <a:fld id="{65BD0805-3DE4-42F4-8F8A-586FAB7F4B35}" type="datetime1">
               <a:rPr lang="en-US" smtClean="0"/>
-              <a:t>2/21/2016</a:t>
+              <a:t>2/24/2016</a:t>
             </a:fld>
             <a:endParaRPr lang="en-US"/>
           </a:p>
@@ -6112,7 +6651,7 @@
             <a:fld id="{B6F15528-21DE-4FAA-801E-634DDDAF4B2B}" type="slidenum">
               <a:rPr lang="en-US" smtClean="0"/>
               <a:pPr/>
-              <a:t>‹#›</a:t>
+              <a:t>‹N°›</a:t>
             </a:fld>
             <a:endParaRPr lang="en-US"/>
           </a:p>
@@ -6314,7 +6853,7 @@
           <a:p>
             <a:fld id="{BB4A7F8F-232B-4297-B1BF-E59E656C9D5C}" type="datetime1">
               <a:rPr lang="en-US" smtClean="0"/>
-              <a:t>2/21/2016</a:t>
+              <a:t>2/24/2016</a:t>
             </a:fld>
             <a:endParaRPr lang="en-US"/>
           </a:p>
@@ -6357,7 +6896,7 @@
             <a:fld id="{B6F15528-21DE-4FAA-801E-634DDDAF4B2B}" type="slidenum">
               <a:rPr lang="en-US" smtClean="0"/>
               <a:pPr/>
-              <a:t>‹#›</a:t>
+              <a:t>‹N°›</a:t>
             </a:fld>
             <a:endParaRPr lang="en-US"/>
           </a:p>
@@ -7139,7 +7678,7 @@
           <a:p>
             <a:fld id="{D1A05AB1-B790-48DE-9DB6-90B8A3209C74}" type="datetime1">
               <a:rPr lang="en-US" smtClean="0"/>
-              <a:t>2/21/2016</a:t>
+              <a:t>2/24/2016</a:t>
             </a:fld>
             <a:endParaRPr lang="en-US"/>
           </a:p>
@@ -7214,7 +7753,7 @@
             <a:fld id="{B6F15528-21DE-4FAA-801E-634DDDAF4B2B}" type="slidenum">
               <a:rPr lang="en-US" smtClean="0"/>
               <a:pPr/>
-              <a:t>‹#›</a:t>
+              <a:t>‹N°›</a:t>
             </a:fld>
             <a:endParaRPr lang="en-US"/>
           </a:p>
@@ -7718,6 +8257,1531 @@
 </p:sld>
 </file>
 
+<file path=ppt/slides/slide10.xml><?xml version="1.0" encoding="utf-8"?>
+<p:sld xmlns:a="http://schemas.openxmlformats.org/drawingml/2006/main" xmlns:r="http://schemas.openxmlformats.org/officeDocument/2006/relationships" xmlns:p="http://schemas.openxmlformats.org/presentationml/2006/main">
+  <p:cSld>
+    <p:spTree>
+      <p:nvGrpSpPr>
+        <p:cNvPr id="1" name=""/>
+        <p:cNvGrpSpPr/>
+        <p:nvPr/>
+      </p:nvGrpSpPr>
+      <p:grpSpPr>
+        <a:xfrm>
+          <a:off x="0" y="0"/>
+          <a:ext cx="0" cy="0"/>
+          <a:chOff x="0" y="0"/>
+          <a:chExt cx="0" cy="0"/>
+        </a:xfrm>
+      </p:grpSpPr>
+      <p:sp>
+        <p:nvSpPr>
+          <p:cNvPr id="2" name="Title 1"/>
+          <p:cNvSpPr>
+            <a:spLocks noGrp="1"/>
+          </p:cNvSpPr>
+          <p:nvPr>
+            <p:ph type="title"/>
+          </p:nvPr>
+        </p:nvSpPr>
+        <p:spPr/>
+        <p:txBody>
+          <a:bodyPr>
+            <a:normAutofit/>
+          </a:bodyPr>
+          <a:lstStyle/>
+          <a:p>
+            <a:r>
+              <a:rPr lang="fr-FR" dirty="0" smtClean="0"/>
+              <a:t>Sources de données supportées</a:t>
+            </a:r>
+            <a:endParaRPr lang="fr-FR" dirty="0"/>
+          </a:p>
+        </p:txBody>
+      </p:sp>
+      <p:sp>
+        <p:nvSpPr>
+          <p:cNvPr id="3" name="Content Placeholder 2"/>
+          <p:cNvSpPr>
+            <a:spLocks noGrp="1"/>
+          </p:cNvSpPr>
+          <p:nvPr>
+            <p:ph idx="1"/>
+          </p:nvPr>
+        </p:nvSpPr>
+        <p:spPr/>
+        <p:txBody>
+          <a:bodyPr/>
+          <a:lstStyle/>
+          <a:p>
+            <a:r>
+              <a:rPr lang="fr-FR" dirty="0" smtClean="0"/>
+              <a:t>MySQL</a:t>
+            </a:r>
+          </a:p>
+          <a:p>
+            <a:r>
+              <a:rPr lang="fr-FR" dirty="0" smtClean="0"/>
+              <a:t>Microsoft SQL Server</a:t>
+            </a:r>
+          </a:p>
+          <a:p>
+            <a:r>
+              <a:rPr lang="fr-FR" dirty="0" err="1" smtClean="0"/>
+              <a:t>PostgreSQL</a:t>
+            </a:r>
+            <a:endParaRPr lang="fr-FR" dirty="0" smtClean="0"/>
+          </a:p>
+          <a:p>
+            <a:r>
+              <a:rPr lang="fr-FR" dirty="0" err="1" smtClean="0"/>
+              <a:t>SQLite</a:t>
+            </a:r>
+            <a:endParaRPr lang="fr-FR" dirty="0" smtClean="0"/>
+          </a:p>
+          <a:p>
+            <a:r>
+              <a:rPr lang="fr-FR" dirty="0" smtClean="0"/>
+              <a:t>Oracle</a:t>
+            </a:r>
+            <a:endParaRPr lang="fr-FR" dirty="0"/>
+          </a:p>
+        </p:txBody>
+      </p:sp>
+      <p:sp>
+        <p:nvSpPr>
+          <p:cNvPr id="4" name="Slide Number Placeholder 3"/>
+          <p:cNvSpPr>
+            <a:spLocks noGrp="1"/>
+          </p:cNvSpPr>
+          <p:nvPr>
+            <p:ph type="sldNum" sz="quarter" idx="12"/>
+          </p:nvPr>
+        </p:nvSpPr>
+        <p:spPr/>
+        <p:txBody>
+          <a:bodyPr/>
+          <a:lstStyle/>
+          <a:p>
+            <a:fld id="{B6F15528-21DE-4FAA-801E-634DDDAF4B2B}" type="slidenum">
+              <a:rPr lang="en-US" smtClean="0"/>
+              <a:pPr/>
+              <a:t>10</a:t>
+            </a:fld>
+            <a:endParaRPr lang="en-US"/>
+          </a:p>
+        </p:txBody>
+      </p:sp>
+    </p:spTree>
+    <p:extLst>
+      <p:ext uri="{BB962C8B-B14F-4D97-AF65-F5344CB8AC3E}">
+        <p14:creationId xmlns:p14="http://schemas.microsoft.com/office/powerpoint/2010/main" val="2368022157"/>
+      </p:ext>
+    </p:extLst>
+  </p:cSld>
+  <p:clrMapOvr>
+    <a:masterClrMapping/>
+  </p:clrMapOvr>
+  <p:timing>
+    <p:tnLst>
+      <p:par>
+        <p:cTn id="1" dur="indefinite" restart="never" nodeType="tmRoot"/>
+      </p:par>
+    </p:tnLst>
+  </p:timing>
+</p:sld>
+</file>
+
+<file path=ppt/slides/slide11.xml><?xml version="1.0" encoding="utf-8"?>
+<p:sld xmlns:a="http://schemas.openxmlformats.org/drawingml/2006/main" xmlns:r="http://schemas.openxmlformats.org/officeDocument/2006/relationships" xmlns:p="http://schemas.openxmlformats.org/presentationml/2006/main">
+  <p:cSld>
+    <p:spTree>
+      <p:nvGrpSpPr>
+        <p:cNvPr id="1" name=""/>
+        <p:cNvGrpSpPr/>
+        <p:nvPr/>
+      </p:nvGrpSpPr>
+      <p:grpSpPr>
+        <a:xfrm>
+          <a:off x="0" y="0"/>
+          <a:ext cx="0" cy="0"/>
+          <a:chOff x="0" y="0"/>
+          <a:chExt cx="0" cy="0"/>
+        </a:xfrm>
+      </p:grpSpPr>
+      <p:sp>
+        <p:nvSpPr>
+          <p:cNvPr id="2" name="Title 1"/>
+          <p:cNvSpPr>
+            <a:spLocks noGrp="1"/>
+          </p:cNvSpPr>
+          <p:nvPr>
+            <p:ph type="title"/>
+          </p:nvPr>
+        </p:nvSpPr>
+        <p:spPr/>
+        <p:txBody>
+          <a:bodyPr>
+            <a:normAutofit fontScale="90000"/>
+          </a:bodyPr>
+          <a:lstStyle/>
+          <a:p>
+            <a:r>
+              <a:rPr lang="fr-FR" dirty="0" smtClean="0"/>
+              <a:t>Installation des modules nécessaires</a:t>
+            </a:r>
+            <a:endParaRPr lang="fr-FR" dirty="0"/>
+          </a:p>
+        </p:txBody>
+      </p:sp>
+      <p:sp>
+        <p:nvSpPr>
+          <p:cNvPr id="3" name="Content Placeholder 2"/>
+          <p:cNvSpPr>
+            <a:spLocks noGrp="1"/>
+          </p:cNvSpPr>
+          <p:nvPr>
+            <p:ph idx="1"/>
+          </p:nvPr>
+        </p:nvSpPr>
+        <p:spPr/>
+        <p:txBody>
+          <a:bodyPr/>
+          <a:lstStyle/>
+          <a:p>
+            <a:r>
+              <a:rPr lang="fr-FR" dirty="0" smtClean="0"/>
+              <a:t>MySQL</a:t>
+            </a:r>
+          </a:p>
+          <a:p>
+            <a:r>
+              <a:rPr lang="fr-FR" dirty="0" smtClean="0"/>
+              <a:t>psycopg2</a:t>
+            </a:r>
+            <a:endParaRPr lang="fr-FR" dirty="0" smtClean="0"/>
+          </a:p>
+          <a:p>
+            <a:r>
+              <a:rPr lang="fr-FR" dirty="0" err="1" smtClean="0"/>
+              <a:t>sqlacodegen</a:t>
+            </a:r>
+            <a:endParaRPr lang="fr-FR" dirty="0" smtClean="0"/>
+          </a:p>
+          <a:p>
+            <a:r>
+              <a:rPr lang="fr-FR" dirty="0" err="1" smtClean="0"/>
+              <a:t>SQLAlchemy</a:t>
+            </a:r>
+            <a:endParaRPr lang="fr-FR" dirty="0"/>
+          </a:p>
+          <a:p>
+            <a:r>
+              <a:rPr lang="fr-FR" dirty="0" err="1" smtClean="0"/>
+              <a:t>Argparse</a:t>
+            </a:r>
+            <a:endParaRPr lang="fr-FR" dirty="0" smtClean="0"/>
+          </a:p>
+          <a:p>
+            <a:pPr marL="109728" indent="0">
+              <a:buNone/>
+            </a:pPr>
+            <a:endParaRPr lang="fr-FR" dirty="0" smtClean="0"/>
+          </a:p>
+          <a:p>
+            <a:pPr marL="109728" indent="0">
+              <a:buNone/>
+            </a:pPr>
+            <a:r>
+              <a:rPr lang="fr-FR" dirty="0" err="1" smtClean="0"/>
+              <a:t>Utlisation</a:t>
+            </a:r>
+            <a:r>
+              <a:rPr lang="fr-FR" dirty="0" smtClean="0"/>
+              <a:t> de la commande :</a:t>
+            </a:r>
+          </a:p>
+          <a:p>
+            <a:pPr marL="109728" indent="0">
+              <a:buNone/>
+            </a:pPr>
+            <a:r>
+              <a:rPr lang="fr-FR" b="1" dirty="0">
+                <a:solidFill>
+                  <a:srgbClr val="00B050"/>
+                </a:solidFill>
+              </a:rPr>
+              <a:t> </a:t>
+            </a:r>
+            <a:r>
+              <a:rPr lang="fr-FR" b="1" dirty="0" smtClean="0">
+                <a:solidFill>
+                  <a:srgbClr val="00B050"/>
+                </a:solidFill>
+              </a:rPr>
+              <a:t>                     </a:t>
+            </a:r>
+            <a:r>
+              <a:rPr lang="fr-FR" b="1" dirty="0" err="1" smtClean="0">
+                <a:solidFill>
+                  <a:srgbClr val="00B050"/>
+                </a:solidFill>
+              </a:rPr>
+              <a:t>pip</a:t>
+            </a:r>
+            <a:r>
+              <a:rPr lang="fr-FR" b="1" dirty="0" smtClean="0">
+                <a:solidFill>
+                  <a:srgbClr val="00B050"/>
+                </a:solidFill>
+              </a:rPr>
+              <a:t> </a:t>
+            </a:r>
+            <a:r>
+              <a:rPr lang="fr-FR" b="1" dirty="0" err="1" smtClean="0">
+                <a:solidFill>
+                  <a:srgbClr val="00B050"/>
+                </a:solidFill>
+              </a:rPr>
+              <a:t>install</a:t>
+            </a:r>
+            <a:r>
+              <a:rPr lang="fr-FR" b="1" dirty="0" smtClean="0">
+                <a:solidFill>
+                  <a:srgbClr val="00B050"/>
+                </a:solidFill>
+              </a:rPr>
+              <a:t> </a:t>
+            </a:r>
+            <a:r>
+              <a:rPr lang="fr-FR" b="1" dirty="0" err="1" smtClean="0">
+                <a:solidFill>
+                  <a:srgbClr val="00B050"/>
+                </a:solidFill>
+              </a:rPr>
+              <a:t>nom_module</a:t>
+            </a:r>
+            <a:endParaRPr lang="fr-FR" b="1" dirty="0" smtClean="0">
+              <a:solidFill>
+                <a:srgbClr val="00B050"/>
+              </a:solidFill>
+            </a:endParaRPr>
+          </a:p>
+        </p:txBody>
+      </p:sp>
+      <p:sp>
+        <p:nvSpPr>
+          <p:cNvPr id="4" name="Slide Number Placeholder 3"/>
+          <p:cNvSpPr>
+            <a:spLocks noGrp="1"/>
+          </p:cNvSpPr>
+          <p:nvPr>
+            <p:ph type="sldNum" sz="quarter" idx="12"/>
+          </p:nvPr>
+        </p:nvSpPr>
+        <p:spPr/>
+        <p:txBody>
+          <a:bodyPr/>
+          <a:lstStyle/>
+          <a:p>
+            <a:fld id="{B6F15528-21DE-4FAA-801E-634DDDAF4B2B}" type="slidenum">
+              <a:rPr lang="en-US" smtClean="0"/>
+              <a:pPr/>
+              <a:t>11</a:t>
+            </a:fld>
+            <a:endParaRPr lang="en-US"/>
+          </a:p>
+        </p:txBody>
+      </p:sp>
+    </p:spTree>
+    <p:extLst>
+      <p:ext uri="{BB962C8B-B14F-4D97-AF65-F5344CB8AC3E}">
+        <p14:creationId xmlns:p14="http://schemas.microsoft.com/office/powerpoint/2010/main" val="2068597097"/>
+      </p:ext>
+    </p:extLst>
+  </p:cSld>
+  <p:clrMapOvr>
+    <a:masterClrMapping/>
+  </p:clrMapOvr>
+  <p:timing>
+    <p:tnLst>
+      <p:par>
+        <p:cTn id="1" dur="indefinite" restart="never" nodeType="tmRoot"/>
+      </p:par>
+    </p:tnLst>
+  </p:timing>
+</p:sld>
+</file>
+
+<file path=ppt/slides/slide12.xml><?xml version="1.0" encoding="utf-8"?>
+<p:sld xmlns:a="http://schemas.openxmlformats.org/drawingml/2006/main" xmlns:r="http://schemas.openxmlformats.org/officeDocument/2006/relationships" xmlns:p="http://schemas.openxmlformats.org/presentationml/2006/main">
+  <p:cSld>
+    <p:spTree>
+      <p:nvGrpSpPr>
+        <p:cNvPr id="1" name=""/>
+        <p:cNvGrpSpPr/>
+        <p:nvPr/>
+      </p:nvGrpSpPr>
+      <p:grpSpPr>
+        <a:xfrm>
+          <a:off x="0" y="0"/>
+          <a:ext cx="0" cy="0"/>
+          <a:chOff x="0" y="0"/>
+          <a:chExt cx="0" cy="0"/>
+        </a:xfrm>
+      </p:grpSpPr>
+      <p:sp>
+        <p:nvSpPr>
+          <p:cNvPr id="2" name="Title 1"/>
+          <p:cNvSpPr>
+            <a:spLocks noGrp="1"/>
+          </p:cNvSpPr>
+          <p:nvPr>
+            <p:ph type="title"/>
+          </p:nvPr>
+        </p:nvSpPr>
+        <p:spPr/>
+        <p:txBody>
+          <a:bodyPr/>
+          <a:lstStyle/>
+          <a:p>
+            <a:r>
+              <a:rPr lang="fr-FR" dirty="0" smtClean="0"/>
+              <a:t>Outils utilisés:</a:t>
+            </a:r>
+            <a:endParaRPr lang="fr-FR" dirty="0"/>
+          </a:p>
+        </p:txBody>
+      </p:sp>
+      <p:sp>
+        <p:nvSpPr>
+          <p:cNvPr id="3" name="Content Placeholder 2"/>
+          <p:cNvSpPr>
+            <a:spLocks noGrp="1"/>
+          </p:cNvSpPr>
+          <p:nvPr>
+            <p:ph idx="1"/>
+          </p:nvPr>
+        </p:nvSpPr>
+        <p:spPr/>
+        <p:txBody>
+          <a:bodyPr/>
+          <a:lstStyle/>
+          <a:p>
+            <a:r>
+              <a:rPr lang="fr-FR" dirty="0" smtClean="0"/>
+              <a:t>Db2bin</a:t>
+            </a:r>
+          </a:p>
+          <a:p>
+            <a:r>
+              <a:rPr lang="fr-FR" dirty="0" smtClean="0"/>
+              <a:t>Bin2xml</a:t>
+            </a:r>
+          </a:p>
+          <a:p>
+            <a:r>
+              <a:rPr lang="fr-FR" dirty="0" smtClean="0"/>
+              <a:t>Bin2json</a:t>
+            </a:r>
+          </a:p>
+          <a:p>
+            <a:r>
+              <a:rPr lang="fr-FR" dirty="0"/>
+              <a:t>B</a:t>
+            </a:r>
+            <a:r>
+              <a:rPr lang="fr-FR" dirty="0" smtClean="0"/>
+              <a:t>in2csv</a:t>
+            </a:r>
+            <a:endParaRPr lang="fr-FR" dirty="0"/>
+          </a:p>
+        </p:txBody>
+      </p:sp>
+      <p:sp>
+        <p:nvSpPr>
+          <p:cNvPr id="4" name="Slide Number Placeholder 3"/>
+          <p:cNvSpPr>
+            <a:spLocks noGrp="1"/>
+          </p:cNvSpPr>
+          <p:nvPr>
+            <p:ph type="sldNum" sz="quarter" idx="12"/>
+          </p:nvPr>
+        </p:nvSpPr>
+        <p:spPr/>
+        <p:txBody>
+          <a:bodyPr/>
+          <a:lstStyle/>
+          <a:p>
+            <a:fld id="{B6F15528-21DE-4FAA-801E-634DDDAF4B2B}" type="slidenum">
+              <a:rPr lang="en-US" smtClean="0"/>
+              <a:pPr/>
+              <a:t>12</a:t>
+            </a:fld>
+            <a:endParaRPr lang="en-US"/>
+          </a:p>
+        </p:txBody>
+      </p:sp>
+    </p:spTree>
+    <p:extLst>
+      <p:ext uri="{BB962C8B-B14F-4D97-AF65-F5344CB8AC3E}">
+        <p14:creationId xmlns:p14="http://schemas.microsoft.com/office/powerpoint/2010/main" val="2709547000"/>
+      </p:ext>
+    </p:extLst>
+  </p:cSld>
+  <p:clrMapOvr>
+    <a:masterClrMapping/>
+  </p:clrMapOvr>
+  <p:timing>
+    <p:tnLst>
+      <p:par>
+        <p:cTn id="1" dur="indefinite" restart="never" nodeType="tmRoot"/>
+      </p:par>
+    </p:tnLst>
+  </p:timing>
+</p:sld>
+</file>
+
+<file path=ppt/slides/slide13.xml><?xml version="1.0" encoding="utf-8"?>
+<p:sld xmlns:a="http://schemas.openxmlformats.org/drawingml/2006/main" xmlns:r="http://schemas.openxmlformats.org/officeDocument/2006/relationships" xmlns:p="http://schemas.openxmlformats.org/presentationml/2006/main">
+  <p:cSld>
+    <p:spTree>
+      <p:nvGrpSpPr>
+        <p:cNvPr id="1" name=""/>
+        <p:cNvGrpSpPr/>
+        <p:nvPr/>
+      </p:nvGrpSpPr>
+      <p:grpSpPr>
+        <a:xfrm>
+          <a:off x="0" y="0"/>
+          <a:ext cx="0" cy="0"/>
+          <a:chOff x="0" y="0"/>
+          <a:chExt cx="0" cy="0"/>
+        </a:xfrm>
+      </p:grpSpPr>
+      <p:sp>
+        <p:nvSpPr>
+          <p:cNvPr id="2" name="Title 1"/>
+          <p:cNvSpPr>
+            <a:spLocks noGrp="1"/>
+          </p:cNvSpPr>
+          <p:nvPr>
+            <p:ph type="title"/>
+          </p:nvPr>
+        </p:nvSpPr>
+        <p:spPr/>
+        <p:txBody>
+          <a:bodyPr/>
+          <a:lstStyle/>
+          <a:p>
+            <a:r>
+              <a:rPr lang="fr-FR" dirty="0" smtClean="0"/>
+              <a:t>Db2bin.py</a:t>
+            </a:r>
+            <a:endParaRPr lang="fr-FR" dirty="0"/>
+          </a:p>
+        </p:txBody>
+      </p:sp>
+      <p:graphicFrame>
+        <p:nvGraphicFramePr>
+          <p:cNvPr id="5" name="Content Placeholder 4"/>
+          <p:cNvGraphicFramePr>
+            <a:graphicFrameLocks noGrp="1"/>
+          </p:cNvGraphicFramePr>
+          <p:nvPr>
+            <p:ph idx="1"/>
+            <p:extLst>
+              <p:ext uri="{D42A27DB-BD31-4B8C-83A1-F6EECF244321}">
+                <p14:modId xmlns:p14="http://schemas.microsoft.com/office/powerpoint/2010/main" val="3672723798"/>
+              </p:ext>
+            </p:extLst>
+          </p:nvPr>
+        </p:nvGraphicFramePr>
+        <p:xfrm>
+          <a:off x="457200" y="2249488"/>
+          <a:ext cx="8229600" cy="4324350"/>
+        </p:xfrm>
+        <a:graphic>
+          <a:graphicData uri="http://schemas.openxmlformats.org/drawingml/2006/diagram">
+            <dgm:relIds xmlns:dgm="http://schemas.openxmlformats.org/drawingml/2006/diagram" xmlns:r="http://schemas.openxmlformats.org/officeDocument/2006/relationships" r:dm="rId2" r:lo="rId3" r:qs="rId4" r:cs="rId5"/>
+          </a:graphicData>
+        </a:graphic>
+      </p:graphicFrame>
+      <p:sp>
+        <p:nvSpPr>
+          <p:cNvPr id="4" name="Slide Number Placeholder 3"/>
+          <p:cNvSpPr>
+            <a:spLocks noGrp="1"/>
+          </p:cNvSpPr>
+          <p:nvPr>
+            <p:ph type="sldNum" sz="quarter" idx="12"/>
+          </p:nvPr>
+        </p:nvSpPr>
+        <p:spPr/>
+        <p:txBody>
+          <a:bodyPr/>
+          <a:lstStyle/>
+          <a:p>
+            <a:fld id="{B6F15528-21DE-4FAA-801E-634DDDAF4B2B}" type="slidenum">
+              <a:rPr lang="en-US" smtClean="0"/>
+              <a:pPr/>
+              <a:t>13</a:t>
+            </a:fld>
+            <a:endParaRPr lang="en-US"/>
+          </a:p>
+        </p:txBody>
+      </p:sp>
+      <p:sp>
+        <p:nvSpPr>
+          <p:cNvPr id="6" name="Rounded Rectangle 5"/>
+          <p:cNvSpPr/>
+          <p:nvPr/>
+        </p:nvSpPr>
+        <p:spPr>
+          <a:xfrm>
+            <a:off x="914400" y="3810000"/>
+            <a:ext cx="1295400" cy="533400"/>
+          </a:xfrm>
+          <a:prstGeom prst="roundRect">
+            <a:avLst/>
+          </a:prstGeom>
+        </p:spPr>
+        <p:style>
+          <a:lnRef idx="2">
+            <a:schemeClr val="accent4">
+              <a:shade val="50000"/>
+            </a:schemeClr>
+          </a:lnRef>
+          <a:fillRef idx="1">
+            <a:schemeClr val="accent4"/>
+          </a:fillRef>
+          <a:effectRef idx="0">
+            <a:schemeClr val="accent4"/>
+          </a:effectRef>
+          <a:fontRef idx="minor">
+            <a:schemeClr val="lt1"/>
+          </a:fontRef>
+        </p:style>
+        <p:txBody>
+          <a:bodyPr rtlCol="0" anchor="ctr"/>
+          <a:lstStyle/>
+          <a:p>
+            <a:pPr algn="ctr"/>
+            <a:r>
+              <a:rPr lang="fr-FR" dirty="0" err="1"/>
+              <a:t>argparse</a:t>
+            </a:r>
+            <a:endParaRPr lang="fr-FR" dirty="0"/>
+          </a:p>
+        </p:txBody>
+      </p:sp>
+      <p:sp>
+        <p:nvSpPr>
+          <p:cNvPr id="10" name="Rounded Rectangle 9"/>
+          <p:cNvSpPr/>
+          <p:nvPr/>
+        </p:nvSpPr>
+        <p:spPr>
+          <a:xfrm>
+            <a:off x="3717758" y="3810000"/>
+            <a:ext cx="1752600" cy="533400"/>
+          </a:xfrm>
+          <a:prstGeom prst="roundRect">
+            <a:avLst/>
+          </a:prstGeom>
+        </p:spPr>
+        <p:style>
+          <a:lnRef idx="2">
+            <a:schemeClr val="accent4">
+              <a:shade val="50000"/>
+            </a:schemeClr>
+          </a:lnRef>
+          <a:fillRef idx="1">
+            <a:schemeClr val="accent4"/>
+          </a:fillRef>
+          <a:effectRef idx="0">
+            <a:schemeClr val="accent4"/>
+          </a:effectRef>
+          <a:fontRef idx="minor">
+            <a:schemeClr val="lt1"/>
+          </a:fontRef>
+        </p:style>
+        <p:txBody>
+          <a:bodyPr rtlCol="0" anchor="ctr"/>
+          <a:lstStyle/>
+          <a:p>
+            <a:pPr algn="ctr"/>
+            <a:r>
+              <a:rPr lang="fr-FR" dirty="0" err="1" smtClean="0"/>
+              <a:t>SQLAlchemy</a:t>
+            </a:r>
+            <a:endParaRPr lang="fr-FR" dirty="0"/>
+          </a:p>
+        </p:txBody>
+      </p:sp>
+      <p:sp>
+        <p:nvSpPr>
+          <p:cNvPr id="11" name="Rounded Rectangle 10"/>
+          <p:cNvSpPr/>
+          <p:nvPr/>
+        </p:nvSpPr>
+        <p:spPr>
+          <a:xfrm>
+            <a:off x="6737684" y="3761874"/>
+            <a:ext cx="1752600" cy="533400"/>
+          </a:xfrm>
+          <a:prstGeom prst="roundRect">
+            <a:avLst/>
+          </a:prstGeom>
+        </p:spPr>
+        <p:style>
+          <a:lnRef idx="2">
+            <a:schemeClr val="accent4">
+              <a:shade val="50000"/>
+            </a:schemeClr>
+          </a:lnRef>
+          <a:fillRef idx="1">
+            <a:schemeClr val="accent4"/>
+          </a:fillRef>
+          <a:effectRef idx="0">
+            <a:schemeClr val="accent4"/>
+          </a:effectRef>
+          <a:fontRef idx="minor">
+            <a:schemeClr val="lt1"/>
+          </a:fontRef>
+        </p:style>
+        <p:txBody>
+          <a:bodyPr rtlCol="0" anchor="ctr"/>
+          <a:lstStyle/>
+          <a:p>
+            <a:pPr algn="ctr"/>
+            <a:r>
+              <a:rPr lang="fr-FR" dirty="0" err="1" smtClean="0"/>
+              <a:t>SQLaCodeGen</a:t>
+            </a:r>
+            <a:endParaRPr lang="fr-FR" dirty="0"/>
+          </a:p>
+        </p:txBody>
+      </p:sp>
+      <p:sp>
+        <p:nvSpPr>
+          <p:cNvPr id="12" name="Rounded Rectangle 11"/>
+          <p:cNvSpPr/>
+          <p:nvPr/>
+        </p:nvSpPr>
+        <p:spPr>
+          <a:xfrm>
+            <a:off x="3886200" y="5943600"/>
+            <a:ext cx="1371600" cy="533400"/>
+          </a:xfrm>
+          <a:prstGeom prst="roundRect">
+            <a:avLst/>
+          </a:prstGeom>
+        </p:spPr>
+        <p:style>
+          <a:lnRef idx="2">
+            <a:schemeClr val="accent4">
+              <a:shade val="50000"/>
+            </a:schemeClr>
+          </a:lnRef>
+          <a:fillRef idx="1">
+            <a:schemeClr val="accent4"/>
+          </a:fillRef>
+          <a:effectRef idx="0">
+            <a:schemeClr val="accent4"/>
+          </a:effectRef>
+          <a:fontRef idx="minor">
+            <a:schemeClr val="lt1"/>
+          </a:fontRef>
+        </p:style>
+        <p:txBody>
+          <a:bodyPr rtlCol="0" anchor="ctr"/>
+          <a:lstStyle/>
+          <a:p>
+            <a:pPr algn="ctr"/>
+            <a:r>
+              <a:rPr lang="fr-FR" dirty="0" err="1"/>
+              <a:t>pickle</a:t>
+            </a:r>
+            <a:endParaRPr lang="fr-FR" dirty="0"/>
+          </a:p>
+        </p:txBody>
+      </p:sp>
+      <p:sp>
+        <p:nvSpPr>
+          <p:cNvPr id="13" name="Rounded Rectangle 12"/>
+          <p:cNvSpPr/>
+          <p:nvPr/>
+        </p:nvSpPr>
+        <p:spPr>
+          <a:xfrm>
+            <a:off x="6721642" y="5943600"/>
+            <a:ext cx="1752600" cy="533400"/>
+          </a:xfrm>
+          <a:prstGeom prst="roundRect">
+            <a:avLst/>
+          </a:prstGeom>
+        </p:spPr>
+        <p:style>
+          <a:lnRef idx="2">
+            <a:schemeClr val="accent4">
+              <a:shade val="50000"/>
+            </a:schemeClr>
+          </a:lnRef>
+          <a:fillRef idx="1">
+            <a:schemeClr val="accent4"/>
+          </a:fillRef>
+          <a:effectRef idx="0">
+            <a:schemeClr val="accent4"/>
+          </a:effectRef>
+          <a:fontRef idx="minor">
+            <a:schemeClr val="lt1"/>
+          </a:fontRef>
+        </p:style>
+        <p:txBody>
+          <a:bodyPr rtlCol="0" anchor="ctr"/>
+          <a:lstStyle/>
+          <a:p>
+            <a:pPr algn="ctr"/>
+            <a:r>
+              <a:rPr lang="fr-FR" dirty="0" err="1" smtClean="0"/>
+              <a:t>SQLAlchemy</a:t>
+            </a:r>
+            <a:endParaRPr lang="fr-FR" dirty="0"/>
+          </a:p>
+        </p:txBody>
+      </p:sp>
+    </p:spTree>
+    <p:extLst>
+      <p:ext uri="{BB962C8B-B14F-4D97-AF65-F5344CB8AC3E}">
+        <p14:creationId xmlns:p14="http://schemas.microsoft.com/office/powerpoint/2010/main" val="171972762"/>
+      </p:ext>
+    </p:extLst>
+  </p:cSld>
+  <p:clrMapOvr>
+    <a:masterClrMapping/>
+  </p:clrMapOvr>
+  <p:timing>
+    <p:tnLst>
+      <p:par>
+        <p:cTn id="1" dur="indefinite" restart="never" nodeType="tmRoot"/>
+      </p:par>
+    </p:tnLst>
+  </p:timing>
+</p:sld>
+</file>
+
+<file path=ppt/slides/slide14.xml><?xml version="1.0" encoding="utf-8"?>
+<p:sld xmlns:a="http://schemas.openxmlformats.org/drawingml/2006/main" xmlns:r="http://schemas.openxmlformats.org/officeDocument/2006/relationships" xmlns:p="http://schemas.openxmlformats.org/presentationml/2006/main">
+  <p:cSld>
+    <p:spTree>
+      <p:nvGrpSpPr>
+        <p:cNvPr id="1" name=""/>
+        <p:cNvGrpSpPr/>
+        <p:nvPr/>
+      </p:nvGrpSpPr>
+      <p:grpSpPr>
+        <a:xfrm>
+          <a:off x="0" y="0"/>
+          <a:ext cx="0" cy="0"/>
+          <a:chOff x="0" y="0"/>
+          <a:chExt cx="0" cy="0"/>
+        </a:xfrm>
+      </p:grpSpPr>
+      <p:sp>
+        <p:nvSpPr>
+          <p:cNvPr id="2" name="Title 1"/>
+          <p:cNvSpPr>
+            <a:spLocks noGrp="1"/>
+          </p:cNvSpPr>
+          <p:nvPr>
+            <p:ph type="title"/>
+          </p:nvPr>
+        </p:nvSpPr>
+        <p:spPr/>
+        <p:txBody>
+          <a:bodyPr>
+            <a:normAutofit/>
+          </a:bodyPr>
+          <a:lstStyle/>
+          <a:p>
+            <a:r>
+              <a:rPr lang="fr-FR" dirty="0" smtClean="0"/>
+              <a:t>Bin2xml.</a:t>
+            </a:r>
+            <a:r>
+              <a:rPr lang="fr-FR" dirty="0" smtClean="0"/>
+              <a:t>py</a:t>
+            </a:r>
+            <a:endParaRPr lang="fr-FR" dirty="0"/>
+          </a:p>
+        </p:txBody>
+      </p:sp>
+      <p:sp>
+        <p:nvSpPr>
+          <p:cNvPr id="4" name="Slide Number Placeholder 3"/>
+          <p:cNvSpPr>
+            <a:spLocks noGrp="1"/>
+          </p:cNvSpPr>
+          <p:nvPr>
+            <p:ph type="sldNum" sz="quarter" idx="12"/>
+          </p:nvPr>
+        </p:nvSpPr>
+        <p:spPr/>
+        <p:txBody>
+          <a:bodyPr/>
+          <a:lstStyle/>
+          <a:p>
+            <a:fld id="{B6F15528-21DE-4FAA-801E-634DDDAF4B2B}" type="slidenum">
+              <a:rPr lang="en-US" smtClean="0"/>
+              <a:pPr/>
+              <a:t>14</a:t>
+            </a:fld>
+            <a:endParaRPr lang="en-US"/>
+          </a:p>
+        </p:txBody>
+      </p:sp>
+      <p:pic>
+        <p:nvPicPr>
+          <p:cNvPr id="1026" name="Picture 2" descr="Résultat de recherche d'images pour &quot;Bin2xml&quot;"/>
+          <p:cNvPicPr>
+            <a:picLocks noChangeAspect="1" noChangeArrowheads="1"/>
+          </p:cNvPicPr>
+          <p:nvPr/>
+        </p:nvPicPr>
+        <p:blipFill>
+          <a:blip r:embed="rId3">
+            <a:extLst>
+              <a:ext uri="{28A0092B-C50C-407E-A947-70E740481C1C}">
+                <a14:useLocalDpi xmlns:a14="http://schemas.microsoft.com/office/drawing/2010/main" val="0"/>
+              </a:ext>
+            </a:extLst>
+          </a:blip>
+          <a:srcRect/>
+          <a:stretch>
+            <a:fillRect/>
+          </a:stretch>
+        </p:blipFill>
+        <p:spPr bwMode="auto">
+          <a:xfrm>
+            <a:off x="762000" y="2209800"/>
+            <a:ext cx="7543800" cy="4191000"/>
+          </a:xfrm>
+          <a:prstGeom prst="rect">
+            <a:avLst/>
+          </a:prstGeom>
+          <a:noFill/>
+          <a:extLst>
+            <a:ext uri="{909E8E84-426E-40DD-AFC4-6F175D3DCCD1}">
+              <a14:hiddenFill xmlns:a14="http://schemas.microsoft.com/office/drawing/2010/main">
+                <a:solidFill>
+                  <a:srgbClr val="FFFFFF"/>
+                </a:solidFill>
+              </a14:hiddenFill>
+            </a:ext>
+          </a:extLst>
+        </p:spPr>
+      </p:pic>
+    </p:spTree>
+    <p:extLst>
+      <p:ext uri="{BB962C8B-B14F-4D97-AF65-F5344CB8AC3E}">
+        <p14:creationId xmlns:p14="http://schemas.microsoft.com/office/powerpoint/2010/main" val="673694921"/>
+      </p:ext>
+    </p:extLst>
+  </p:cSld>
+  <p:clrMapOvr>
+    <a:masterClrMapping/>
+  </p:clrMapOvr>
+  <p:timing>
+    <p:tnLst>
+      <p:par>
+        <p:cTn id="1" dur="indefinite" restart="never" nodeType="tmRoot"/>
+      </p:par>
+    </p:tnLst>
+  </p:timing>
+</p:sld>
+</file>
+
+<file path=ppt/slides/slide15.xml><?xml version="1.0" encoding="utf-8"?>
+<p:sld xmlns:a="http://schemas.openxmlformats.org/drawingml/2006/main" xmlns:r="http://schemas.openxmlformats.org/officeDocument/2006/relationships" xmlns:p="http://schemas.openxmlformats.org/presentationml/2006/main">
+  <p:cSld>
+    <p:spTree>
+      <p:nvGrpSpPr>
+        <p:cNvPr id="1" name=""/>
+        <p:cNvGrpSpPr/>
+        <p:nvPr/>
+      </p:nvGrpSpPr>
+      <p:grpSpPr>
+        <a:xfrm>
+          <a:off x="0" y="0"/>
+          <a:ext cx="0" cy="0"/>
+          <a:chOff x="0" y="0"/>
+          <a:chExt cx="0" cy="0"/>
+        </a:xfrm>
+      </p:grpSpPr>
+      <p:sp>
+        <p:nvSpPr>
+          <p:cNvPr id="2" name="Title 1"/>
+          <p:cNvSpPr>
+            <a:spLocks noGrp="1"/>
+          </p:cNvSpPr>
+          <p:nvPr>
+            <p:ph type="title"/>
+          </p:nvPr>
+        </p:nvSpPr>
+        <p:spPr/>
+        <p:txBody>
+          <a:bodyPr>
+            <a:normAutofit/>
+          </a:bodyPr>
+          <a:lstStyle/>
+          <a:p>
+            <a:r>
+              <a:rPr lang="fr-FR" dirty="0" smtClean="0"/>
+              <a:t>Bin2json.</a:t>
+            </a:r>
+            <a:r>
+              <a:rPr lang="fr-FR" dirty="0" smtClean="0"/>
+              <a:t>py</a:t>
+            </a:r>
+            <a:endParaRPr lang="fr-FR" dirty="0"/>
+          </a:p>
+        </p:txBody>
+      </p:sp>
+      <p:sp>
+        <p:nvSpPr>
+          <p:cNvPr id="4" name="Slide Number Placeholder 3"/>
+          <p:cNvSpPr>
+            <a:spLocks noGrp="1"/>
+          </p:cNvSpPr>
+          <p:nvPr>
+            <p:ph type="sldNum" sz="quarter" idx="12"/>
+          </p:nvPr>
+        </p:nvSpPr>
+        <p:spPr/>
+        <p:txBody>
+          <a:bodyPr/>
+          <a:lstStyle/>
+          <a:p>
+            <a:fld id="{B6F15528-21DE-4FAA-801E-634DDDAF4B2B}" type="slidenum">
+              <a:rPr lang="en-US" smtClean="0"/>
+              <a:pPr/>
+              <a:t>15</a:t>
+            </a:fld>
+            <a:endParaRPr lang="en-US"/>
+          </a:p>
+        </p:txBody>
+      </p:sp>
+      <p:pic>
+        <p:nvPicPr>
+          <p:cNvPr id="1026" name="Picture 2" descr="Résultat de recherche d'images pour &quot;Bin2xml&quot;"/>
+          <p:cNvPicPr>
+            <a:picLocks noChangeAspect="1" noChangeArrowheads="1"/>
+          </p:cNvPicPr>
+          <p:nvPr/>
+        </p:nvPicPr>
+        <p:blipFill>
+          <a:blip r:embed="rId3">
+            <a:extLst>
+              <a:ext uri="{28A0092B-C50C-407E-A947-70E740481C1C}">
+                <a14:useLocalDpi xmlns:a14="http://schemas.microsoft.com/office/drawing/2010/main" val="0"/>
+              </a:ext>
+            </a:extLst>
+          </a:blip>
+          <a:srcRect/>
+          <a:stretch>
+            <a:fillRect/>
+          </a:stretch>
+        </p:blipFill>
+        <p:spPr bwMode="auto">
+          <a:xfrm>
+            <a:off x="762000" y="2209800"/>
+            <a:ext cx="7543800" cy="4191000"/>
+          </a:xfrm>
+          <a:prstGeom prst="rect">
+            <a:avLst/>
+          </a:prstGeom>
+          <a:noFill/>
+          <a:extLst>
+            <a:ext uri="{909E8E84-426E-40DD-AFC4-6F175D3DCCD1}">
+              <a14:hiddenFill xmlns:a14="http://schemas.microsoft.com/office/drawing/2010/main">
+                <a:solidFill>
+                  <a:srgbClr val="FFFFFF"/>
+                </a:solidFill>
+              </a14:hiddenFill>
+            </a:ext>
+          </a:extLst>
+        </p:spPr>
+      </p:pic>
+    </p:spTree>
+    <p:extLst>
+      <p:ext uri="{BB962C8B-B14F-4D97-AF65-F5344CB8AC3E}">
+        <p14:creationId xmlns:p14="http://schemas.microsoft.com/office/powerpoint/2010/main" val="1763545492"/>
+      </p:ext>
+    </p:extLst>
+  </p:cSld>
+  <p:clrMapOvr>
+    <a:masterClrMapping/>
+  </p:clrMapOvr>
+  <p:timing>
+    <p:tnLst>
+      <p:par>
+        <p:cTn id="1" dur="indefinite" restart="never" nodeType="tmRoot"/>
+      </p:par>
+    </p:tnLst>
+  </p:timing>
+</p:sld>
+</file>
+
+<file path=ppt/slides/slide16.xml><?xml version="1.0" encoding="utf-8"?>
+<p:sld xmlns:a="http://schemas.openxmlformats.org/drawingml/2006/main" xmlns:r="http://schemas.openxmlformats.org/officeDocument/2006/relationships" xmlns:p="http://schemas.openxmlformats.org/presentationml/2006/main">
+  <p:cSld>
+    <p:spTree>
+      <p:nvGrpSpPr>
+        <p:cNvPr id="1" name=""/>
+        <p:cNvGrpSpPr/>
+        <p:nvPr/>
+      </p:nvGrpSpPr>
+      <p:grpSpPr>
+        <a:xfrm>
+          <a:off x="0" y="0"/>
+          <a:ext cx="0" cy="0"/>
+          <a:chOff x="0" y="0"/>
+          <a:chExt cx="0" cy="0"/>
+        </a:xfrm>
+      </p:grpSpPr>
+      <p:sp>
+        <p:nvSpPr>
+          <p:cNvPr id="2" name="Title 1"/>
+          <p:cNvSpPr>
+            <a:spLocks noGrp="1"/>
+          </p:cNvSpPr>
+          <p:nvPr>
+            <p:ph type="title"/>
+          </p:nvPr>
+        </p:nvSpPr>
+        <p:spPr/>
+        <p:txBody>
+          <a:bodyPr>
+            <a:normAutofit/>
+          </a:bodyPr>
+          <a:lstStyle/>
+          <a:p>
+            <a:r>
+              <a:rPr lang="fr-FR" dirty="0" smtClean="0"/>
+              <a:t>Bin2csv.</a:t>
+            </a:r>
+            <a:r>
+              <a:rPr lang="fr-FR" dirty="0" smtClean="0"/>
+              <a:t>py</a:t>
+            </a:r>
+            <a:endParaRPr lang="fr-FR" dirty="0"/>
+          </a:p>
+        </p:txBody>
+      </p:sp>
+      <p:sp>
+        <p:nvSpPr>
+          <p:cNvPr id="4" name="Slide Number Placeholder 3"/>
+          <p:cNvSpPr>
+            <a:spLocks noGrp="1"/>
+          </p:cNvSpPr>
+          <p:nvPr>
+            <p:ph type="sldNum" sz="quarter" idx="12"/>
+          </p:nvPr>
+        </p:nvSpPr>
+        <p:spPr/>
+        <p:txBody>
+          <a:bodyPr/>
+          <a:lstStyle/>
+          <a:p>
+            <a:fld id="{B6F15528-21DE-4FAA-801E-634DDDAF4B2B}" type="slidenum">
+              <a:rPr lang="en-US" smtClean="0"/>
+              <a:pPr/>
+              <a:t>16</a:t>
+            </a:fld>
+            <a:endParaRPr lang="en-US"/>
+          </a:p>
+        </p:txBody>
+      </p:sp>
+      <p:pic>
+        <p:nvPicPr>
+          <p:cNvPr id="1026" name="Picture 2" descr="Résultat de recherche d'images pour &quot;Bin2xml&quot;"/>
+          <p:cNvPicPr>
+            <a:picLocks noChangeAspect="1" noChangeArrowheads="1"/>
+          </p:cNvPicPr>
+          <p:nvPr/>
+        </p:nvPicPr>
+        <p:blipFill>
+          <a:blip r:embed="rId3">
+            <a:extLst>
+              <a:ext uri="{28A0092B-C50C-407E-A947-70E740481C1C}">
+                <a14:useLocalDpi xmlns:a14="http://schemas.microsoft.com/office/drawing/2010/main" val="0"/>
+              </a:ext>
+            </a:extLst>
+          </a:blip>
+          <a:srcRect/>
+          <a:stretch>
+            <a:fillRect/>
+          </a:stretch>
+        </p:blipFill>
+        <p:spPr bwMode="auto">
+          <a:xfrm>
+            <a:off x="762000" y="2209800"/>
+            <a:ext cx="7543800" cy="4191000"/>
+          </a:xfrm>
+          <a:prstGeom prst="rect">
+            <a:avLst/>
+          </a:prstGeom>
+          <a:noFill/>
+          <a:extLst>
+            <a:ext uri="{909E8E84-426E-40DD-AFC4-6F175D3DCCD1}">
+              <a14:hiddenFill xmlns:a14="http://schemas.microsoft.com/office/drawing/2010/main">
+                <a:solidFill>
+                  <a:srgbClr val="FFFFFF"/>
+                </a:solidFill>
+              </a14:hiddenFill>
+            </a:ext>
+          </a:extLst>
+        </p:spPr>
+      </p:pic>
+    </p:spTree>
+    <p:extLst>
+      <p:ext uri="{BB962C8B-B14F-4D97-AF65-F5344CB8AC3E}">
+        <p14:creationId xmlns:p14="http://schemas.microsoft.com/office/powerpoint/2010/main" val="2222582161"/>
+      </p:ext>
+    </p:extLst>
+  </p:cSld>
+  <p:clrMapOvr>
+    <a:masterClrMapping/>
+  </p:clrMapOvr>
+  <p:timing>
+    <p:tnLst>
+      <p:par>
+        <p:cTn id="1" dur="indefinite" restart="never" nodeType="tmRoot"/>
+      </p:par>
+    </p:tnLst>
+  </p:timing>
+</p:sld>
+</file>
+
+<file path=ppt/slides/slide17.xml><?xml version="1.0" encoding="utf-8"?>
+<p:sld xmlns:a="http://schemas.openxmlformats.org/drawingml/2006/main" xmlns:r="http://schemas.openxmlformats.org/officeDocument/2006/relationships" xmlns:p="http://schemas.openxmlformats.org/presentationml/2006/main">
+  <p:cSld>
+    <p:spTree>
+      <p:nvGrpSpPr>
+        <p:cNvPr id="1" name=""/>
+        <p:cNvGrpSpPr/>
+        <p:nvPr/>
+      </p:nvGrpSpPr>
+      <p:grpSpPr>
+        <a:xfrm>
+          <a:off x="0" y="0"/>
+          <a:ext cx="0" cy="0"/>
+          <a:chOff x="0" y="0"/>
+          <a:chExt cx="0" cy="0"/>
+        </a:xfrm>
+      </p:grpSpPr>
+      <p:sp>
+        <p:nvSpPr>
+          <p:cNvPr id="2" name="Titre 1"/>
+          <p:cNvSpPr>
+            <a:spLocks noGrp="1"/>
+          </p:cNvSpPr>
+          <p:nvPr>
+            <p:ph type="title"/>
+          </p:nvPr>
+        </p:nvSpPr>
+        <p:spPr/>
+        <p:txBody>
+          <a:bodyPr>
+            <a:normAutofit fontScale="90000"/>
+          </a:bodyPr>
+          <a:lstStyle/>
+          <a:p>
+            <a:pPr algn="ctr"/>
+            <a:r>
+              <a:rPr lang="fr-FR" dirty="0" smtClean="0"/>
+              <a:t>Conception de la base de données MySQL</a:t>
+            </a:r>
+            <a:endParaRPr lang="fr-FR" dirty="0"/>
+          </a:p>
+        </p:txBody>
+      </p:sp>
+      <p:sp>
+        <p:nvSpPr>
+          <p:cNvPr id="3" name="Espace réservé du numéro de diapositive 2"/>
+          <p:cNvSpPr>
+            <a:spLocks noGrp="1"/>
+          </p:cNvSpPr>
+          <p:nvPr>
+            <p:ph type="sldNum" sz="quarter" idx="12"/>
+          </p:nvPr>
+        </p:nvSpPr>
+        <p:spPr/>
+        <p:txBody>
+          <a:bodyPr/>
+          <a:lstStyle/>
+          <a:p>
+            <a:fld id="{B6F15528-21DE-4FAA-801E-634DDDAF4B2B}" type="slidenum">
+              <a:rPr lang="en-US" smtClean="0"/>
+              <a:pPr/>
+              <a:t>17</a:t>
+            </a:fld>
+            <a:endParaRPr lang="en-US"/>
+          </a:p>
+        </p:txBody>
+      </p:sp>
+      <p:pic>
+        <p:nvPicPr>
+          <p:cNvPr id="5" name="Image 4"/>
+          <p:cNvPicPr>
+            <a:picLocks noChangeAspect="1"/>
+          </p:cNvPicPr>
+          <p:nvPr/>
+        </p:nvPicPr>
+        <p:blipFill>
+          <a:blip r:embed="rId3"/>
+          <a:stretch>
+            <a:fillRect/>
+          </a:stretch>
+        </p:blipFill>
+        <p:spPr>
+          <a:xfrm>
+            <a:off x="990600" y="2212848"/>
+            <a:ext cx="6781800" cy="4416552"/>
+          </a:xfrm>
+          <a:prstGeom prst="rect">
+            <a:avLst/>
+          </a:prstGeom>
+        </p:spPr>
+      </p:pic>
+    </p:spTree>
+    <p:extLst>
+      <p:ext uri="{BB962C8B-B14F-4D97-AF65-F5344CB8AC3E}">
+        <p14:creationId xmlns:p14="http://schemas.microsoft.com/office/powerpoint/2010/main" val="1957468042"/>
+      </p:ext>
+    </p:extLst>
+  </p:cSld>
+  <p:clrMapOvr>
+    <a:masterClrMapping/>
+  </p:clrMapOvr>
+  <p:timing>
+    <p:tnLst>
+      <p:par>
+        <p:cTn id="1" dur="indefinite" restart="never" nodeType="tmRoot"/>
+      </p:par>
+    </p:tnLst>
+  </p:timing>
+</p:sld>
+</file>
+
+<file path=ppt/slides/slide18.xml><?xml version="1.0" encoding="utf-8"?>
+<p:sld xmlns:a="http://schemas.openxmlformats.org/drawingml/2006/main" xmlns:r="http://schemas.openxmlformats.org/officeDocument/2006/relationships" xmlns:p="http://schemas.openxmlformats.org/presentationml/2006/main">
+  <p:cSld>
+    <p:spTree>
+      <p:nvGrpSpPr>
+        <p:cNvPr id="1" name=""/>
+        <p:cNvGrpSpPr/>
+        <p:nvPr/>
+      </p:nvGrpSpPr>
+      <p:grpSpPr>
+        <a:xfrm>
+          <a:off x="0" y="0"/>
+          <a:ext cx="0" cy="0"/>
+          <a:chOff x="0" y="0"/>
+          <a:chExt cx="0" cy="0"/>
+        </a:xfrm>
+      </p:grpSpPr>
+      <p:sp>
+        <p:nvSpPr>
+          <p:cNvPr id="2" name="Titre 1"/>
+          <p:cNvSpPr>
+            <a:spLocks noGrp="1"/>
+          </p:cNvSpPr>
+          <p:nvPr>
+            <p:ph type="title"/>
+          </p:nvPr>
+        </p:nvSpPr>
+        <p:spPr/>
+        <p:txBody>
+          <a:bodyPr>
+            <a:normAutofit/>
+          </a:bodyPr>
+          <a:lstStyle/>
+          <a:p>
+            <a:pPr algn="ctr"/>
+            <a:r>
+              <a:rPr lang="fr-FR" dirty="0" smtClean="0"/>
+              <a:t>Diagramme de classe</a:t>
+            </a:r>
+            <a:endParaRPr lang="fr-FR" dirty="0"/>
+          </a:p>
+        </p:txBody>
+      </p:sp>
+      <p:sp>
+        <p:nvSpPr>
+          <p:cNvPr id="3" name="Espace réservé du numéro de diapositive 2"/>
+          <p:cNvSpPr>
+            <a:spLocks noGrp="1"/>
+          </p:cNvSpPr>
+          <p:nvPr>
+            <p:ph type="sldNum" sz="quarter" idx="12"/>
+          </p:nvPr>
+        </p:nvSpPr>
+        <p:spPr/>
+        <p:txBody>
+          <a:bodyPr/>
+          <a:lstStyle/>
+          <a:p>
+            <a:fld id="{B6F15528-21DE-4FAA-801E-634DDDAF4B2B}" type="slidenum">
+              <a:rPr lang="en-US" smtClean="0"/>
+              <a:pPr/>
+              <a:t>18</a:t>
+            </a:fld>
+            <a:endParaRPr lang="en-US"/>
+          </a:p>
+        </p:txBody>
+      </p:sp>
+      <p:pic>
+        <p:nvPicPr>
+          <p:cNvPr id="4" name="Image 3"/>
+          <p:cNvPicPr>
+            <a:picLocks noChangeAspect="1"/>
+          </p:cNvPicPr>
+          <p:nvPr/>
+        </p:nvPicPr>
+        <p:blipFill>
+          <a:blip r:embed="rId3"/>
+          <a:stretch>
+            <a:fillRect/>
+          </a:stretch>
+        </p:blipFill>
+        <p:spPr>
+          <a:xfrm>
+            <a:off x="457201" y="2212848"/>
+            <a:ext cx="8479536" cy="4111752"/>
+          </a:xfrm>
+          <a:prstGeom prst="rect">
+            <a:avLst/>
+          </a:prstGeom>
+        </p:spPr>
+      </p:pic>
+    </p:spTree>
+    <p:extLst>
+      <p:ext uri="{BB962C8B-B14F-4D97-AF65-F5344CB8AC3E}">
+        <p14:creationId xmlns:p14="http://schemas.microsoft.com/office/powerpoint/2010/main" val="51957203"/>
+      </p:ext>
+    </p:extLst>
+  </p:cSld>
+  <p:clrMapOvr>
+    <a:masterClrMapping/>
+  </p:clrMapOvr>
+  <p:timing>
+    <p:tnLst>
+      <p:par>
+        <p:cTn id="1" dur="indefinite" restart="never" nodeType="tmRoot"/>
+      </p:par>
+    </p:tnLst>
+  </p:timing>
+</p:sld>
+</file>
+
+<file path=ppt/slides/slide19.xml><?xml version="1.0" encoding="utf-8"?>
+<p:sld xmlns:a="http://schemas.openxmlformats.org/drawingml/2006/main" xmlns:r="http://schemas.openxmlformats.org/officeDocument/2006/relationships" xmlns:p="http://schemas.openxmlformats.org/presentationml/2006/main">
+  <p:cSld>
+    <p:spTree>
+      <p:nvGrpSpPr>
+        <p:cNvPr id="1" name=""/>
+        <p:cNvGrpSpPr/>
+        <p:nvPr/>
+      </p:nvGrpSpPr>
+      <p:grpSpPr>
+        <a:xfrm>
+          <a:off x="0" y="0"/>
+          <a:ext cx="0" cy="0"/>
+          <a:chOff x="0" y="0"/>
+          <a:chExt cx="0" cy="0"/>
+        </a:xfrm>
+      </p:grpSpPr>
+      <p:sp>
+        <p:nvSpPr>
+          <p:cNvPr id="2" name="Titre 1"/>
+          <p:cNvSpPr>
+            <a:spLocks noGrp="1"/>
+          </p:cNvSpPr>
+          <p:nvPr>
+            <p:ph type="title"/>
+          </p:nvPr>
+        </p:nvSpPr>
+        <p:spPr>
+          <a:xfrm>
+            <a:off x="533400" y="3200400"/>
+            <a:ext cx="8229600" cy="1066800"/>
+          </a:xfrm>
+        </p:spPr>
+        <p:txBody>
+          <a:bodyPr>
+            <a:normAutofit/>
+          </a:bodyPr>
+          <a:lstStyle/>
+          <a:p>
+            <a:pPr algn="ctr"/>
+            <a:r>
+              <a:rPr lang="fr-FR" dirty="0"/>
+              <a:t>Test de </a:t>
+            </a:r>
+            <a:r>
+              <a:rPr lang="fr-FR" dirty="0" smtClean="0"/>
+              <a:t>l’application</a:t>
+            </a:r>
+            <a:endParaRPr lang="fr-FR" dirty="0"/>
+          </a:p>
+        </p:txBody>
+      </p:sp>
+      <p:sp>
+        <p:nvSpPr>
+          <p:cNvPr id="4" name="Espace réservé du numéro de diapositive 3"/>
+          <p:cNvSpPr>
+            <a:spLocks noGrp="1"/>
+          </p:cNvSpPr>
+          <p:nvPr>
+            <p:ph type="sldNum" sz="quarter" idx="12"/>
+          </p:nvPr>
+        </p:nvSpPr>
+        <p:spPr/>
+        <p:txBody>
+          <a:bodyPr/>
+          <a:lstStyle/>
+          <a:p>
+            <a:fld id="{B6F15528-21DE-4FAA-801E-634DDDAF4B2B}" type="slidenum">
+              <a:rPr lang="en-US" smtClean="0"/>
+              <a:pPr/>
+              <a:t>19</a:t>
+            </a:fld>
+            <a:endParaRPr lang="en-US"/>
+          </a:p>
+        </p:txBody>
+      </p:sp>
+    </p:spTree>
+    <p:extLst>
+      <p:ext uri="{BB962C8B-B14F-4D97-AF65-F5344CB8AC3E}">
+        <p14:creationId xmlns:p14="http://schemas.microsoft.com/office/powerpoint/2010/main" val="3275524032"/>
+      </p:ext>
+    </p:extLst>
+  </p:cSld>
+  <p:clrMapOvr>
+    <a:masterClrMapping/>
+  </p:clrMapOvr>
+  <p:timing>
+    <p:tnLst>
+      <p:par>
+        <p:cTn id="1" dur="indefinite" restart="never" nodeType="tmRoot"/>
+      </p:par>
+    </p:tnLst>
+  </p:timing>
+</p:sld>
+</file>
+
 <file path=ppt/slides/slide2.xml><?xml version="1.0" encoding="utf-8"?>
 <p:sld xmlns:a="http://schemas.openxmlformats.org/drawingml/2006/main" xmlns:r="http://schemas.openxmlformats.org/officeDocument/2006/relationships" xmlns:p="http://schemas.openxmlformats.org/presentationml/2006/main">
   <p:cSld>
@@ -7773,7 +9837,41 @@
           <a:bodyPr/>
           <a:lstStyle/>
           <a:p>
-            <a:endParaRPr lang="fr-FR"/>
+            <a:r>
+              <a:rPr lang="fr-FR" dirty="0" smtClean="0"/>
+              <a:t>Introduction</a:t>
+            </a:r>
+          </a:p>
+          <a:p>
+            <a:r>
+              <a:rPr lang="fr-FR" dirty="0" smtClean="0"/>
+              <a:t>Problématique</a:t>
+            </a:r>
+          </a:p>
+          <a:p>
+            <a:r>
+              <a:rPr lang="fr-FR" dirty="0" smtClean="0"/>
+              <a:t>Démarche</a:t>
+            </a:r>
+          </a:p>
+          <a:p>
+            <a:r>
+              <a:rPr lang="fr-FR" dirty="0" smtClean="0"/>
+              <a:t>Conception &amp; Réalisation de l’application</a:t>
+            </a:r>
+          </a:p>
+          <a:p>
+            <a:r>
+              <a:rPr lang="fr-FR" dirty="0" smtClean="0"/>
+              <a:t>Test de l’application</a:t>
+            </a:r>
+          </a:p>
+          <a:p>
+            <a:r>
+              <a:rPr lang="fr-FR" dirty="0" smtClean="0"/>
+              <a:t>Conclusion</a:t>
+            </a:r>
+            <a:endParaRPr lang="fr-FR" dirty="0"/>
           </a:p>
         </p:txBody>
       </p:sp>
@@ -7805,6 +9903,216 @@
     <p:extLst>
       <p:ext uri="{BB962C8B-B14F-4D97-AF65-F5344CB8AC3E}">
         <p14:creationId xmlns:p14="http://schemas.microsoft.com/office/powerpoint/2010/main" val="2481402299"/>
+      </p:ext>
+    </p:extLst>
+  </p:cSld>
+  <p:clrMapOvr>
+    <a:masterClrMapping/>
+  </p:clrMapOvr>
+  <p:timing>
+    <p:tnLst>
+      <p:par>
+        <p:cTn id="1" dur="indefinite" restart="never" nodeType="tmRoot"/>
+      </p:par>
+    </p:tnLst>
+  </p:timing>
+</p:sld>
+</file>
+
+<file path=ppt/slides/slide20.xml><?xml version="1.0" encoding="utf-8"?>
+<p:sld xmlns:a="http://schemas.openxmlformats.org/drawingml/2006/main" xmlns:r="http://schemas.openxmlformats.org/officeDocument/2006/relationships" xmlns:p="http://schemas.openxmlformats.org/presentationml/2006/main">
+  <p:cSld>
+    <p:spTree>
+      <p:nvGrpSpPr>
+        <p:cNvPr id="1" name=""/>
+        <p:cNvGrpSpPr/>
+        <p:nvPr/>
+      </p:nvGrpSpPr>
+      <p:grpSpPr>
+        <a:xfrm>
+          <a:off x="0" y="0"/>
+          <a:ext cx="0" cy="0"/>
+          <a:chOff x="0" y="0"/>
+          <a:chExt cx="0" cy="0"/>
+        </a:xfrm>
+      </p:grpSpPr>
+      <p:sp>
+        <p:nvSpPr>
+          <p:cNvPr id="2" name="Title 1"/>
+          <p:cNvSpPr>
+            <a:spLocks noGrp="1"/>
+          </p:cNvSpPr>
+          <p:nvPr>
+            <p:ph type="ctrTitle"/>
+          </p:nvPr>
+        </p:nvSpPr>
+        <p:spPr/>
+        <p:txBody>
+          <a:bodyPr/>
+          <a:lstStyle/>
+          <a:p>
+            <a:r>
+              <a:rPr lang="fr-FR" dirty="0" smtClean="0"/>
+              <a:t>Conclusion</a:t>
+            </a:r>
+            <a:endParaRPr lang="fr-FR" dirty="0"/>
+          </a:p>
+        </p:txBody>
+      </p:sp>
+      <p:sp>
+        <p:nvSpPr>
+          <p:cNvPr id="4" name="Subtitle 3"/>
+          <p:cNvSpPr>
+            <a:spLocks noGrp="1"/>
+          </p:cNvSpPr>
+          <p:nvPr>
+            <p:ph type="subTitle" idx="1"/>
+          </p:nvPr>
+        </p:nvSpPr>
+        <p:spPr>
+          <a:xfrm>
+            <a:off x="457200" y="3899938"/>
+            <a:ext cx="7848600" cy="2653262"/>
+          </a:xfrm>
+        </p:spPr>
+        <p:txBody>
+          <a:bodyPr>
+            <a:normAutofit/>
+          </a:bodyPr>
+          <a:lstStyle/>
+          <a:p>
+            <a:r>
+              <a:rPr lang="fr-FR" dirty="0" smtClean="0"/>
+              <a:t>Cette Application nous </a:t>
+            </a:r>
+            <a:r>
+              <a:rPr lang="fr-FR" dirty="0"/>
+              <a:t>à demander beaucoup de réflexion mais il nous a permis d’approfondir nos </a:t>
+            </a:r>
+          </a:p>
+          <a:p>
+            <a:r>
+              <a:rPr lang="fr-FR" dirty="0"/>
+              <a:t>bases sur python qui pourrait nous être utile pour le projet final. Nous avons essuyé de nombreux </a:t>
+            </a:r>
+          </a:p>
+          <a:p>
+            <a:r>
+              <a:rPr lang="fr-FR" dirty="0"/>
+              <a:t>échecs avant de parvenir à un résultat optimisé au maximum de nos capacités.</a:t>
+            </a:r>
+            <a:endParaRPr lang="fr-FR" dirty="0"/>
+          </a:p>
+        </p:txBody>
+      </p:sp>
+    </p:spTree>
+    <p:extLst>
+      <p:ext uri="{BB962C8B-B14F-4D97-AF65-F5344CB8AC3E}">
+        <p14:creationId xmlns:p14="http://schemas.microsoft.com/office/powerpoint/2010/main" val="2980002542"/>
+      </p:ext>
+    </p:extLst>
+  </p:cSld>
+  <p:clrMapOvr>
+    <a:masterClrMapping/>
+  </p:clrMapOvr>
+  <p:timing>
+    <p:tnLst>
+      <p:par>
+        <p:cTn id="1" dur="indefinite" restart="never" nodeType="tmRoot"/>
+      </p:par>
+    </p:tnLst>
+  </p:timing>
+</p:sld>
+</file>
+
+<file path=ppt/slides/slide21.xml><?xml version="1.0" encoding="utf-8"?>
+<p:sld xmlns:a="http://schemas.openxmlformats.org/drawingml/2006/main" xmlns:r="http://schemas.openxmlformats.org/officeDocument/2006/relationships" xmlns:p="http://schemas.openxmlformats.org/presentationml/2006/main">
+  <p:cSld>
+    <p:spTree>
+      <p:nvGrpSpPr>
+        <p:cNvPr id="1" name=""/>
+        <p:cNvGrpSpPr/>
+        <p:nvPr/>
+      </p:nvGrpSpPr>
+      <p:grpSpPr>
+        <a:xfrm>
+          <a:off x="0" y="0"/>
+          <a:ext cx="0" cy="0"/>
+          <a:chOff x="0" y="0"/>
+          <a:chExt cx="0" cy="0"/>
+        </a:xfrm>
+      </p:grpSpPr>
+      <p:sp>
+        <p:nvSpPr>
+          <p:cNvPr id="2" name="Espace réservé du numéro de diapositive 1"/>
+          <p:cNvSpPr>
+            <a:spLocks noGrp="1"/>
+          </p:cNvSpPr>
+          <p:nvPr>
+            <p:ph type="sldNum" sz="quarter" idx="12"/>
+          </p:nvPr>
+        </p:nvSpPr>
+        <p:spPr/>
+        <p:txBody>
+          <a:bodyPr/>
+          <a:lstStyle/>
+          <a:p>
+            <a:fld id="{B6F15528-21DE-4FAA-801E-634DDDAF4B2B}" type="slidenum">
+              <a:rPr lang="en-US" smtClean="0"/>
+              <a:pPr/>
+              <a:t>21</a:t>
+            </a:fld>
+            <a:endParaRPr lang="en-US"/>
+          </a:p>
+        </p:txBody>
+      </p:sp>
+      <p:sp>
+        <p:nvSpPr>
+          <p:cNvPr id="3" name="Rectangle 2"/>
+          <p:cNvSpPr/>
+          <p:nvPr/>
+        </p:nvSpPr>
+        <p:spPr>
+          <a:xfrm>
+            <a:off x="1295400" y="3200400"/>
+            <a:ext cx="7122206" cy="707886"/>
+          </a:xfrm>
+          <a:prstGeom prst="rect">
+            <a:avLst/>
+          </a:prstGeom>
+        </p:spPr>
+        <p:txBody>
+          <a:bodyPr wrap="none">
+            <a:spAutoFit/>
+          </a:bodyPr>
+          <a:lstStyle/>
+          <a:p>
+            <a:pPr algn="ctr"/>
+            <a:r>
+              <a:rPr lang="fr-FR" sz="4000" i="1" dirty="0">
+                <a:latin typeface="Broadway" panose="04040905080B02020502" pitchFamily="82" charset="0"/>
+              </a:rPr>
+              <a:t>Avez-vous</a:t>
+            </a:r>
+            <a:r>
+              <a:rPr lang="fr-FR" dirty="0">
+                <a:latin typeface="Broadway" panose="04040905080B02020502" pitchFamily="82" charset="0"/>
+              </a:rPr>
+              <a:t> </a:t>
+            </a:r>
+            <a:r>
+              <a:rPr lang="fr-FR" sz="4000" i="1" dirty="0">
+                <a:latin typeface="Broadway" panose="04040905080B02020502" pitchFamily="82" charset="0"/>
+              </a:rPr>
+              <a:t>des questions ?</a:t>
+            </a:r>
+          </a:p>
+        </p:txBody>
+      </p:sp>
+    </p:spTree>
+    <p:extLst>
+      <p:ext uri="{BB962C8B-B14F-4D97-AF65-F5344CB8AC3E}">
+        <p14:creationId xmlns:p14="http://schemas.microsoft.com/office/powerpoint/2010/main" val="540776163"/>
       </p:ext>
     </p:extLst>
   </p:cSld>
@@ -7840,7 +10148,7 @@
       </p:grpSpPr>
       <p:sp>
         <p:nvSpPr>
-          <p:cNvPr id="4" name="Title 3"/>
+          <p:cNvPr id="2" name="Titre 1"/>
           <p:cNvSpPr>
             <a:spLocks noGrp="1"/>
           </p:cNvSpPr>
@@ -7855,7 +10163,7 @@
           <a:p>
             <a:r>
               <a:rPr lang="fr-FR" dirty="0" smtClean="0"/>
-              <a:t>Avantages</a:t>
+              <a:t>Introduction</a:t>
             </a:r>
             <a:endParaRPr lang="fr-FR" dirty="0"/>
           </a:p>
@@ -7863,7 +10171,7 @@
       </p:sp>
       <p:sp>
         <p:nvSpPr>
-          <p:cNvPr id="5" name="Content Placeholder 4"/>
+          <p:cNvPr id="3" name="Espace réservé du contenu 2"/>
           <p:cNvSpPr>
             <a:spLocks noGrp="1"/>
           </p:cNvSpPr>
@@ -7876,29 +10184,41 @@
           <a:bodyPr/>
           <a:lstStyle/>
           <a:p>
+            <a:pPr marL="109728" indent="0">
+              <a:buNone/>
+            </a:pPr>
+            <a:r>
+              <a:rPr lang="fr-FR" dirty="0"/>
+              <a:t>Le langage  Python permet d'accéder de manière très simple à la majorité des bases de données </a:t>
+            </a:r>
             <a:r>
               <a:rPr lang="fr-FR" dirty="0" smtClean="0"/>
-              <a:t>Ligne de commande</a:t>
-            </a:r>
-          </a:p>
-          <a:p>
+              <a:t>actuelles</a:t>
+            </a:r>
+            <a:r>
+              <a:rPr lang="fr-FR" dirty="0"/>
+              <a:t>, y compris à des bases de données émergentes suivant la tendance actuelle du </a:t>
+            </a:r>
+            <a:endParaRPr lang="fr-FR" dirty="0" smtClean="0"/>
+          </a:p>
+          <a:p>
+            <a:pPr marL="109728" indent="0">
+              <a:buNone/>
+            </a:pPr>
             <a:r>
               <a:rPr lang="fr-FR" dirty="0" smtClean="0"/>
-              <a:t>Automatisation des tâches</a:t>
-            </a:r>
-          </a:p>
-          <a:p>
-            <a:r>
-              <a:rPr lang="fr-FR" dirty="0" err="1" smtClean="0"/>
-              <a:t>Paramètrable</a:t>
-            </a:r>
-            <a:endParaRPr lang="fr-FR" dirty="0"/>
-          </a:p>
-        </p:txBody>
-      </p:sp>
-      <p:sp>
-        <p:nvSpPr>
-          <p:cNvPr id="2" name="Slide Number Placeholder 1"/>
+              <a:t>« </a:t>
+            </a:r>
+            <a:r>
+              <a:rPr lang="fr-FR" dirty="0"/>
+              <a:t>NoSQL ». </a:t>
+            </a:r>
+          </a:p>
+        </p:txBody>
+      </p:sp>
+      <p:sp>
+        <p:nvSpPr>
+          <p:cNvPr id="4" name="Espace réservé du numéro de diapositive 3"/>
           <p:cNvSpPr>
             <a:spLocks noGrp="1"/>
           </p:cNvSpPr>
@@ -7923,7 +10243,7 @@
     </p:spTree>
     <p:extLst>
       <p:ext uri="{BB962C8B-B14F-4D97-AF65-F5344CB8AC3E}">
-        <p14:creationId xmlns:p14="http://schemas.microsoft.com/office/powerpoint/2010/main" val="2434059902"/>
+        <p14:creationId xmlns:p14="http://schemas.microsoft.com/office/powerpoint/2010/main" val="2990950870"/>
       </p:ext>
     </p:extLst>
   </p:cSld>
@@ -7959,7 +10279,7 @@
       </p:grpSpPr>
       <p:sp>
         <p:nvSpPr>
-          <p:cNvPr id="2" name="Title 1"/>
+          <p:cNvPr id="2" name="Titre 1"/>
           <p:cNvSpPr>
             <a:spLocks noGrp="1"/>
           </p:cNvSpPr>
@@ -7969,71 +10289,94 @@
         </p:nvSpPr>
         <p:spPr/>
         <p:txBody>
+          <a:bodyPr/>
+          <a:lstStyle/>
+          <a:p>
+            <a:r>
+              <a:rPr lang="fr-FR" dirty="0"/>
+              <a:t>Problématique</a:t>
+            </a:r>
+          </a:p>
+        </p:txBody>
+      </p:sp>
+      <p:sp>
+        <p:nvSpPr>
+          <p:cNvPr id="3" name="Espace réservé du contenu 2"/>
+          <p:cNvSpPr>
+            <a:spLocks noGrp="1"/>
+          </p:cNvSpPr>
+          <p:nvPr>
+            <p:ph idx="1"/>
+          </p:nvPr>
+        </p:nvSpPr>
+        <p:spPr/>
+        <p:txBody>
           <a:bodyPr>
-            <a:normAutofit/>
+            <a:normAutofit lnSpcReduction="10000"/>
           </a:bodyPr>
           <a:lstStyle/>
           <a:p>
+            <a:pPr>
+              <a:buFont typeface="Wingdings" panose="05000000000000000000" pitchFamily="2" charset="2"/>
+              <a:buChar char="Ø"/>
+            </a:pPr>
+            <a:r>
+              <a:rPr lang="fr-FR" dirty="0"/>
+              <a:t>A nos jours, les entreprises ont plusieurs sources de données et distribuer sur différents types de </a:t>
+            </a:r>
+          </a:p>
+          <a:p>
+            <a:pPr marL="109728" indent="0">
+              <a:buNone/>
+            </a:pPr>
+            <a:r>
+              <a:rPr lang="fr-FR" dirty="0"/>
+              <a:t>serveurs, ce qui rends difficile de les gérer sans unifier leur formats. </a:t>
+            </a:r>
+          </a:p>
+          <a:p>
+            <a:pPr>
+              <a:buFont typeface="Wingdings" panose="05000000000000000000" pitchFamily="2" charset="2"/>
+              <a:buChar char="Ø"/>
+            </a:pPr>
             <a:r>
               <a:rPr lang="fr-FR" dirty="0" smtClean="0"/>
-              <a:t>Sources de données supportées</a:t>
-            </a:r>
-            <a:endParaRPr lang="fr-FR" dirty="0"/>
-          </a:p>
-        </p:txBody>
-      </p:sp>
-      <p:sp>
-        <p:nvSpPr>
-          <p:cNvPr id="3" name="Content Placeholder 2"/>
-          <p:cNvSpPr>
-            <a:spLocks noGrp="1"/>
-          </p:cNvSpPr>
-          <p:nvPr>
-            <p:ph idx="1"/>
-          </p:nvPr>
-        </p:nvSpPr>
-        <p:spPr/>
-        <p:txBody>
-          <a:bodyPr/>
-          <a:lstStyle/>
-          <a:p>
+              <a:t>Le </a:t>
+            </a:r>
+            <a:r>
+              <a:rPr lang="fr-FR" dirty="0"/>
+              <a:t>but de ce projet et de réaliser une boite à outils qui permettra à un </a:t>
+            </a:r>
             <a:r>
               <a:rPr lang="fr-FR" dirty="0" smtClean="0"/>
-              <a:t>MySQL</a:t>
-            </a:r>
-          </a:p>
-          <a:p>
+              <a:t>administrateur </a:t>
+            </a:r>
+            <a:r>
+              <a:rPr lang="fr-FR" dirty="0"/>
+              <a:t>de base de </a:t>
+            </a:r>
             <a:r>
               <a:rPr lang="fr-FR" dirty="0" smtClean="0"/>
-              <a:t>Microsoft SQL Server</a:t>
-            </a:r>
-          </a:p>
-          <a:p>
-            <a:r>
-              <a:rPr lang="fr-FR" dirty="0" err="1" smtClean="0"/>
-              <a:t>PostgreSQL</a:t>
-            </a:r>
-            <a:endParaRPr lang="fr-FR" dirty="0" smtClean="0"/>
-          </a:p>
-          <a:p>
-            <a:r>
-              <a:rPr lang="fr-FR" dirty="0" err="1" smtClean="0"/>
-              <a:t>SQLite</a:t>
-            </a:r>
-            <a:endParaRPr lang="fr-FR" dirty="0" smtClean="0"/>
-          </a:p>
-          <a:p>
+              <a:t>données </a:t>
+            </a:r>
+            <a:r>
+              <a:rPr lang="fr-FR" dirty="0"/>
+              <a:t>d’extraire les données et les transformer en fichier binaire. Et aussi de manipuler ces fichiers </a:t>
+            </a:r>
             <a:r>
               <a:rPr lang="fr-FR" dirty="0" smtClean="0"/>
-              <a:t>Oracle</a:t>
-            </a:r>
-            <a:endParaRPr lang="fr-FR" dirty="0"/>
-          </a:p>
-        </p:txBody>
-      </p:sp>
-      <p:sp>
-        <p:nvSpPr>
-          <p:cNvPr id="4" name="Slide Number Placeholder 3"/>
+              <a:t>pour </a:t>
+            </a:r>
+            <a:r>
+              <a:rPr lang="fr-FR" dirty="0"/>
+              <a:t>les convertir en différents formats à savoir JSON, CSV, XML…</a:t>
+            </a:r>
+          </a:p>
+        </p:txBody>
+      </p:sp>
+      <p:sp>
+        <p:nvSpPr>
+          <p:cNvPr id="4" name="Espace réservé du numéro de diapositive 3"/>
           <p:cNvSpPr>
             <a:spLocks noGrp="1"/>
           </p:cNvSpPr>
@@ -8058,7 +10401,7 @@
     </p:spTree>
     <p:extLst>
       <p:ext uri="{BB962C8B-B14F-4D97-AF65-F5344CB8AC3E}">
-        <p14:creationId xmlns:p14="http://schemas.microsoft.com/office/powerpoint/2010/main" val="2368022157"/>
+        <p14:creationId xmlns:p14="http://schemas.microsoft.com/office/powerpoint/2010/main" val="1472502856"/>
       </p:ext>
     </p:extLst>
   </p:cSld>
@@ -8094,7 +10437,7 @@
       </p:grpSpPr>
       <p:sp>
         <p:nvSpPr>
-          <p:cNvPr id="2" name="Title 1"/>
+          <p:cNvPr id="2" name="Titre 1"/>
           <p:cNvSpPr>
             <a:spLocks noGrp="1"/>
           </p:cNvSpPr>
@@ -8108,8 +10451,46 @@
           <a:lstStyle/>
           <a:p>
             <a:r>
+              <a:rPr lang="fr-FR" dirty="0"/>
+              <a:t>Démarche</a:t>
+            </a:r>
+          </a:p>
+        </p:txBody>
+      </p:sp>
+      <p:sp>
+        <p:nvSpPr>
+          <p:cNvPr id="3" name="Espace réservé du contenu 2"/>
+          <p:cNvSpPr>
+            <a:spLocks noGrp="1"/>
+          </p:cNvSpPr>
+          <p:nvPr>
+            <p:ph idx="1"/>
+          </p:nvPr>
+        </p:nvSpPr>
+        <p:spPr/>
+        <p:txBody>
+          <a:bodyPr/>
+          <a:lstStyle/>
+          <a:p>
+            <a:pPr marL="109728" indent="0">
+              <a:buNone/>
+            </a:pPr>
+            <a:r>
+              <a:rPr lang="fr-FR" dirty="0"/>
+              <a:t>L’objectif principal du projet est de développer une application console générant des fichiers de  </a:t>
+            </a:r>
+          </a:p>
+          <a:p>
+            <a:pPr marL="109728" indent="0">
+              <a:buNone/>
+            </a:pPr>
+            <a:r>
+              <a:rPr lang="fr-FR" dirty="0"/>
+              <a:t>différents formats (binaire,JSON,XML,CSV</a:t>
+            </a:r>
+            <a:r>
               <a:rPr lang="fr-FR" dirty="0" smtClean="0"/>
-              <a:t>Outils</a:t>
+              <a:t>). </a:t>
             </a:r>
             <a:endParaRPr lang="fr-FR" dirty="0"/>
           </a:p>
@@ -8117,48 +10498,7 @@
       </p:sp>
       <p:sp>
         <p:nvSpPr>
-          <p:cNvPr id="3" name="Content Placeholder 2"/>
-          <p:cNvSpPr>
-            <a:spLocks noGrp="1"/>
-          </p:cNvSpPr>
-          <p:nvPr>
-            <p:ph idx="1"/>
-          </p:nvPr>
-        </p:nvSpPr>
-        <p:spPr/>
-        <p:txBody>
-          <a:bodyPr/>
-          <a:lstStyle/>
-          <a:p>
-            <a:r>
-              <a:rPr lang="fr-FR" dirty="0" smtClean="0"/>
-              <a:t>Db2bin</a:t>
-            </a:r>
-          </a:p>
-          <a:p>
-            <a:r>
-              <a:rPr lang="fr-FR" dirty="0" smtClean="0"/>
-              <a:t>Bin2xml</a:t>
-            </a:r>
-          </a:p>
-          <a:p>
-            <a:r>
-              <a:rPr lang="fr-FR" dirty="0" smtClean="0"/>
-              <a:t>Bin2json</a:t>
-            </a:r>
-          </a:p>
-          <a:p>
-            <a:r>
-              <a:rPr lang="fr-FR" dirty="0" smtClean="0"/>
-              <a:t>bin2csv</a:t>
-            </a:r>
-            <a:endParaRPr lang="fr-FR" dirty="0"/>
-          </a:p>
-        </p:txBody>
-      </p:sp>
-      <p:sp>
-        <p:nvSpPr>
-          <p:cNvPr id="4" name="Slide Number Placeholder 3"/>
+          <p:cNvPr id="4" name="Espace réservé du numéro de diapositive 3"/>
           <p:cNvSpPr>
             <a:spLocks noGrp="1"/>
           </p:cNvSpPr>
@@ -8183,7 +10523,7 @@
     </p:spTree>
     <p:extLst>
       <p:ext uri="{BB962C8B-B14F-4D97-AF65-F5344CB8AC3E}">
-        <p14:creationId xmlns:p14="http://schemas.microsoft.com/office/powerpoint/2010/main" val="2709547000"/>
+        <p14:creationId xmlns:p14="http://schemas.microsoft.com/office/powerpoint/2010/main" val="2375044874"/>
       </p:ext>
     </p:extLst>
   </p:cSld>
@@ -8219,55 +10559,7 @@
       </p:grpSpPr>
       <p:sp>
         <p:nvSpPr>
-          <p:cNvPr id="2" name="Title 1"/>
-          <p:cNvSpPr>
-            <a:spLocks noGrp="1"/>
-          </p:cNvSpPr>
-          <p:nvPr>
-            <p:ph type="title"/>
-          </p:nvPr>
-        </p:nvSpPr>
-        <p:spPr/>
-        <p:txBody>
-          <a:bodyPr/>
-          <a:lstStyle/>
-          <a:p>
-            <a:r>
-              <a:rPr lang="fr-FR" dirty="0" smtClean="0"/>
-              <a:t>Db2bin.py</a:t>
-            </a:r>
-            <a:endParaRPr lang="fr-FR" dirty="0"/>
-          </a:p>
-        </p:txBody>
-      </p:sp>
-      <p:graphicFrame>
-        <p:nvGraphicFramePr>
-          <p:cNvPr id="5" name="Content Placeholder 4"/>
-          <p:cNvGraphicFramePr>
-            <a:graphicFrameLocks noGrp="1"/>
-          </p:cNvGraphicFramePr>
-          <p:nvPr>
-            <p:ph idx="1"/>
-            <p:extLst>
-              <p:ext uri="{D42A27DB-BD31-4B8C-83A1-F6EECF244321}">
-                <p14:modId xmlns:p14="http://schemas.microsoft.com/office/powerpoint/2010/main" val="3672723798"/>
-              </p:ext>
-            </p:extLst>
-          </p:nvPr>
-        </p:nvGraphicFramePr>
-        <p:xfrm>
-          <a:off x="457200" y="2249488"/>
-          <a:ext cx="8229600" cy="4324350"/>
-        </p:xfrm>
-        <a:graphic>
-          <a:graphicData uri="http://schemas.openxmlformats.org/drawingml/2006/diagram">
-            <dgm:relIds xmlns:dgm="http://schemas.openxmlformats.org/drawingml/2006/diagram" xmlns:r="http://schemas.openxmlformats.org/officeDocument/2006/relationships" r:dm="rId2" r:lo="rId3" r:qs="rId4" r:cs="rId5"/>
-          </a:graphicData>
-        </a:graphic>
-      </p:graphicFrame>
-      <p:sp>
-        <p:nvSpPr>
-          <p:cNvPr id="4" name="Slide Number Placeholder 3"/>
+          <p:cNvPr id="2" name="Espace réservé du numéro de diapositive 1"/>
           <p:cNvSpPr>
             <a:spLocks noGrp="1"/>
           </p:cNvSpPr>
@@ -8289,230 +10581,34 @@
           </a:p>
         </p:txBody>
       </p:sp>
-      <p:sp>
-        <p:nvSpPr>
-          <p:cNvPr id="6" name="Rounded Rectangle 5"/>
-          <p:cNvSpPr/>
+      <p:pic>
+        <p:nvPicPr>
+          <p:cNvPr id="3" name="Image 2"/>
+          <p:cNvPicPr>
+            <a:picLocks noChangeAspect="1"/>
+          </p:cNvPicPr>
           <p:nvPr/>
-        </p:nvSpPr>
+        </p:nvPicPr>
+        <p:blipFill>
+          <a:blip r:embed="rId2"/>
+          <a:stretch>
+            <a:fillRect/>
+          </a:stretch>
+        </p:blipFill>
         <p:spPr>
           <a:xfrm>
-            <a:off x="914400" y="3810000"/>
-            <a:ext cx="1295400" cy="533400"/>
+            <a:off x="457201" y="914400"/>
+            <a:ext cx="8305800" cy="5486400"/>
           </a:xfrm>
-          <a:prstGeom prst="roundRect">
+          <a:prstGeom prst="rect">
             <a:avLst/>
           </a:prstGeom>
         </p:spPr>
-        <p:style>
-          <a:lnRef idx="2">
-            <a:schemeClr val="accent4">
-              <a:shade val="50000"/>
-            </a:schemeClr>
-          </a:lnRef>
-          <a:fillRef idx="1">
-            <a:schemeClr val="accent4"/>
-          </a:fillRef>
-          <a:effectRef idx="0">
-            <a:schemeClr val="accent4"/>
-          </a:effectRef>
-          <a:fontRef idx="minor">
-            <a:schemeClr val="lt1"/>
-          </a:fontRef>
-        </p:style>
-        <p:txBody>
-          <a:bodyPr rtlCol="0" anchor="ctr"/>
-          <a:lstStyle/>
-          <a:p>
-            <a:pPr algn="ctr"/>
-            <a:r>
-              <a:rPr lang="fr-FR" dirty="0" err="1"/>
-              <a:t>argparse</a:t>
-            </a:r>
-            <a:endParaRPr lang="fr-FR" dirty="0"/>
-          </a:p>
-        </p:txBody>
-      </p:sp>
-      <p:sp>
-        <p:nvSpPr>
-          <p:cNvPr id="10" name="Rounded Rectangle 9"/>
-          <p:cNvSpPr/>
-          <p:nvPr/>
-        </p:nvSpPr>
-        <p:spPr>
-          <a:xfrm>
-            <a:off x="3717758" y="3810000"/>
-            <a:ext cx="1752600" cy="533400"/>
-          </a:xfrm>
-          <a:prstGeom prst="roundRect">
-            <a:avLst/>
-          </a:prstGeom>
-        </p:spPr>
-        <p:style>
-          <a:lnRef idx="2">
-            <a:schemeClr val="accent4">
-              <a:shade val="50000"/>
-            </a:schemeClr>
-          </a:lnRef>
-          <a:fillRef idx="1">
-            <a:schemeClr val="accent4"/>
-          </a:fillRef>
-          <a:effectRef idx="0">
-            <a:schemeClr val="accent4"/>
-          </a:effectRef>
-          <a:fontRef idx="minor">
-            <a:schemeClr val="lt1"/>
-          </a:fontRef>
-        </p:style>
-        <p:txBody>
-          <a:bodyPr rtlCol="0" anchor="ctr"/>
-          <a:lstStyle/>
-          <a:p>
-            <a:pPr algn="ctr"/>
-            <a:r>
-              <a:rPr lang="fr-FR" dirty="0" err="1" smtClean="0"/>
-              <a:t>SQLAlchemy</a:t>
-            </a:r>
-            <a:endParaRPr lang="fr-FR" dirty="0"/>
-          </a:p>
-        </p:txBody>
-      </p:sp>
-      <p:sp>
-        <p:nvSpPr>
-          <p:cNvPr id="11" name="Rounded Rectangle 10"/>
-          <p:cNvSpPr/>
-          <p:nvPr/>
-        </p:nvSpPr>
-        <p:spPr>
-          <a:xfrm>
-            <a:off x="6737684" y="3761874"/>
-            <a:ext cx="1752600" cy="533400"/>
-          </a:xfrm>
-          <a:prstGeom prst="roundRect">
-            <a:avLst/>
-          </a:prstGeom>
-        </p:spPr>
-        <p:style>
-          <a:lnRef idx="2">
-            <a:schemeClr val="accent4">
-              <a:shade val="50000"/>
-            </a:schemeClr>
-          </a:lnRef>
-          <a:fillRef idx="1">
-            <a:schemeClr val="accent4"/>
-          </a:fillRef>
-          <a:effectRef idx="0">
-            <a:schemeClr val="accent4"/>
-          </a:effectRef>
-          <a:fontRef idx="minor">
-            <a:schemeClr val="lt1"/>
-          </a:fontRef>
-        </p:style>
-        <p:txBody>
-          <a:bodyPr rtlCol="0" anchor="ctr"/>
-          <a:lstStyle/>
-          <a:p>
-            <a:pPr algn="ctr"/>
-            <a:r>
-              <a:rPr lang="fr-FR" dirty="0" err="1" smtClean="0"/>
-              <a:t>SQLaCodeGen</a:t>
-            </a:r>
-            <a:endParaRPr lang="fr-FR" dirty="0"/>
-          </a:p>
-        </p:txBody>
-      </p:sp>
-      <p:sp>
-        <p:nvSpPr>
-          <p:cNvPr id="12" name="Rounded Rectangle 11"/>
-          <p:cNvSpPr/>
-          <p:nvPr/>
-        </p:nvSpPr>
-        <p:spPr>
-          <a:xfrm>
-            <a:off x="3886200" y="5943600"/>
-            <a:ext cx="1371600" cy="533400"/>
-          </a:xfrm>
-          <a:prstGeom prst="roundRect">
-            <a:avLst/>
-          </a:prstGeom>
-        </p:spPr>
-        <p:style>
-          <a:lnRef idx="2">
-            <a:schemeClr val="accent4">
-              <a:shade val="50000"/>
-            </a:schemeClr>
-          </a:lnRef>
-          <a:fillRef idx="1">
-            <a:schemeClr val="accent4"/>
-          </a:fillRef>
-          <a:effectRef idx="0">
-            <a:schemeClr val="accent4"/>
-          </a:effectRef>
-          <a:fontRef idx="minor">
-            <a:schemeClr val="lt1"/>
-          </a:fontRef>
-        </p:style>
-        <p:txBody>
-          <a:bodyPr rtlCol="0" anchor="ctr"/>
-          <a:lstStyle/>
-          <a:p>
-            <a:pPr algn="ctr"/>
-            <a:r>
-              <a:rPr lang="fr-FR" dirty="0" err="1"/>
-              <a:t>pickle</a:t>
-            </a:r>
-            <a:endParaRPr lang="fr-FR" dirty="0"/>
-          </a:p>
-        </p:txBody>
-      </p:sp>
-      <p:sp>
-        <p:nvSpPr>
-          <p:cNvPr id="13" name="Rounded Rectangle 12"/>
-          <p:cNvSpPr/>
-          <p:nvPr/>
-        </p:nvSpPr>
-        <p:spPr>
-          <a:xfrm>
-            <a:off x="6721642" y="5943600"/>
-            <a:ext cx="1752600" cy="533400"/>
-          </a:xfrm>
-          <a:prstGeom prst="roundRect">
-            <a:avLst/>
-          </a:prstGeom>
-        </p:spPr>
-        <p:style>
-          <a:lnRef idx="2">
-            <a:schemeClr val="accent4">
-              <a:shade val="50000"/>
-            </a:schemeClr>
-          </a:lnRef>
-          <a:fillRef idx="1">
-            <a:schemeClr val="accent4"/>
-          </a:fillRef>
-          <a:effectRef idx="0">
-            <a:schemeClr val="accent4"/>
-          </a:effectRef>
-          <a:fontRef idx="minor">
-            <a:schemeClr val="lt1"/>
-          </a:fontRef>
-        </p:style>
-        <p:txBody>
-          <a:bodyPr rtlCol="0" anchor="ctr"/>
-          <a:lstStyle/>
-          <a:p>
-            <a:pPr algn="ctr"/>
-            <a:r>
-              <a:rPr lang="fr-FR" dirty="0" err="1" smtClean="0"/>
-              <a:t>SQLAlchemy</a:t>
-            </a:r>
-            <a:endParaRPr lang="fr-FR" dirty="0"/>
-          </a:p>
-        </p:txBody>
-      </p:sp>
+      </p:pic>
     </p:spTree>
     <p:extLst>
       <p:ext uri="{BB962C8B-B14F-4D97-AF65-F5344CB8AC3E}">
-        <p14:creationId xmlns:p14="http://schemas.microsoft.com/office/powerpoint/2010/main" val="673694921"/>
+        <p14:creationId xmlns:p14="http://schemas.microsoft.com/office/powerpoint/2010/main" val="3536391773"/>
       </p:ext>
     </p:extLst>
   </p:cSld>
@@ -8548,7 +10644,7 @@
       </p:grpSpPr>
       <p:sp>
         <p:nvSpPr>
-          <p:cNvPr id="2" name="Title 1"/>
+          <p:cNvPr id="2" name="Titre 1"/>
           <p:cNvSpPr>
             <a:spLocks noGrp="1"/>
           </p:cNvSpPr>
@@ -8556,64 +10652,29 @@
             <p:ph type="title"/>
           </p:nvPr>
         </p:nvSpPr>
-        <p:spPr/>
-        <p:txBody>
-          <a:bodyPr/>
-          <a:lstStyle/>
-          <a:p>
-            <a:r>
-              <a:rPr lang="fr-FR" dirty="0" smtClean="0"/>
-              <a:t>Outils utilisés</a:t>
-            </a:r>
-            <a:endParaRPr lang="fr-FR" dirty="0"/>
-          </a:p>
-        </p:txBody>
-      </p:sp>
-      <p:sp>
-        <p:nvSpPr>
-          <p:cNvPr id="3" name="Content Placeholder 2"/>
-          <p:cNvSpPr>
-            <a:spLocks noGrp="1"/>
-          </p:cNvSpPr>
-          <p:nvPr>
-            <p:ph idx="1"/>
-          </p:nvPr>
-        </p:nvSpPr>
-        <p:spPr/>
-        <p:txBody>
-          <a:bodyPr/>
-          <a:lstStyle/>
-          <a:p>
-            <a:r>
-              <a:rPr lang="fr-FR" dirty="0" err="1" smtClean="0"/>
-              <a:t>pyCharm</a:t>
-            </a:r>
-            <a:endParaRPr lang="fr-FR" dirty="0" smtClean="0"/>
-          </a:p>
-          <a:p>
-            <a:r>
-              <a:rPr lang="fr-FR" dirty="0" smtClean="0"/>
-              <a:t>Git</a:t>
-            </a:r>
-          </a:p>
-          <a:p>
-            <a:r>
-              <a:rPr lang="fr-FR" dirty="0" smtClean="0"/>
-              <a:t>Bitbucket.org</a:t>
-            </a:r>
-          </a:p>
-          <a:p>
-            <a:r>
-              <a:rPr lang="fr-FR" dirty="0" smtClean="0"/>
-              <a:t>Python 2.7</a:t>
-            </a:r>
-            <a:endParaRPr lang="fr-FR" dirty="0"/>
-          </a:p>
-        </p:txBody>
-      </p:sp>
-      <p:sp>
-        <p:nvSpPr>
-          <p:cNvPr id="4" name="Slide Number Placeholder 3"/>
+        <p:spPr>
+          <a:xfrm>
+            <a:off x="533400" y="3124200"/>
+            <a:ext cx="8229600" cy="1066800"/>
+          </a:xfrm>
+        </p:spPr>
+        <p:txBody>
+          <a:bodyPr>
+            <a:normAutofit fontScale="90000"/>
+          </a:bodyPr>
+          <a:lstStyle/>
+          <a:p>
+            <a:pPr algn="ctr"/>
+            <a:r>
+              <a:rPr lang="fr-FR" dirty="0"/>
+              <a:t>Conception &amp; Réalisation de l’application</a:t>
+            </a:r>
+          </a:p>
+        </p:txBody>
+      </p:sp>
+      <p:sp>
+        <p:nvSpPr>
+          <p:cNvPr id="4" name="Espace réservé du numéro de diapositive 3"/>
           <p:cNvSpPr>
             <a:spLocks noGrp="1"/>
           </p:cNvSpPr>
@@ -8638,7 +10699,7 @@
     </p:spTree>
     <p:extLst>
       <p:ext uri="{BB962C8B-B14F-4D97-AF65-F5344CB8AC3E}">
-        <p14:creationId xmlns:p14="http://schemas.microsoft.com/office/powerpoint/2010/main" val="2945344990"/>
+        <p14:creationId xmlns:p14="http://schemas.microsoft.com/office/powerpoint/2010/main" val="3365371096"/>
       </p:ext>
     </p:extLst>
   </p:cSld>
@@ -8679,7 +10740,7 @@
             <a:spLocks noGrp="1"/>
           </p:cNvSpPr>
           <p:nvPr>
-            <p:ph type="ctrTitle"/>
+            <p:ph type="title"/>
           </p:nvPr>
         </p:nvSpPr>
         <p:spPr/>
@@ -8689,7 +10750,7 @@
           <a:p>
             <a:r>
               <a:rPr lang="fr-FR" dirty="0" smtClean="0"/>
-              <a:t>Conclusion</a:t>
+              <a:t>Environnement du travail</a:t>
             </a:r>
             <a:endParaRPr lang="fr-FR" dirty="0"/>
           </a:p>
@@ -8697,12 +10758,12 @@
       </p:sp>
       <p:sp>
         <p:nvSpPr>
-          <p:cNvPr id="4" name="Subtitle 3"/>
-          <p:cNvSpPr>
-            <a:spLocks noGrp="1"/>
-          </p:cNvSpPr>
-          <p:nvPr>
-            <p:ph type="subTitle" idx="1"/>
+          <p:cNvPr id="3" name="Content Placeholder 2"/>
+          <p:cNvSpPr>
+            <a:spLocks noGrp="1"/>
+          </p:cNvSpPr>
+          <p:nvPr>
+            <p:ph idx="1"/>
           </p:nvPr>
         </p:nvSpPr>
         <p:spPr/>
@@ -8710,14 +10771,65 @@
           <a:bodyPr/>
           <a:lstStyle/>
           <a:p>
+            <a:r>
+              <a:rPr lang="fr-FR" dirty="0" err="1"/>
+              <a:t>P</a:t>
+            </a:r>
+            <a:r>
+              <a:rPr lang="fr-FR" dirty="0" err="1" smtClean="0"/>
+              <a:t>yCharm</a:t>
+            </a:r>
+            <a:endParaRPr lang="fr-FR" dirty="0" smtClean="0"/>
+          </a:p>
+          <a:p>
+            <a:r>
+              <a:rPr lang="fr-FR" dirty="0" smtClean="0"/>
+              <a:t>Git</a:t>
+            </a:r>
+          </a:p>
+          <a:p>
+            <a:r>
+              <a:rPr lang="fr-FR" dirty="0" smtClean="0"/>
+              <a:t>Bitbucket.org</a:t>
+            </a:r>
+          </a:p>
+          <a:p>
+            <a:r>
+              <a:rPr lang="fr-FR" dirty="0" smtClean="0"/>
+              <a:t>Python 2.7</a:t>
+            </a:r>
             <a:endParaRPr lang="fr-FR" dirty="0"/>
+          </a:p>
+        </p:txBody>
+      </p:sp>
+      <p:sp>
+        <p:nvSpPr>
+          <p:cNvPr id="4" name="Slide Number Placeholder 3"/>
+          <p:cNvSpPr>
+            <a:spLocks noGrp="1"/>
+          </p:cNvSpPr>
+          <p:nvPr>
+            <p:ph type="sldNum" sz="quarter" idx="12"/>
+          </p:nvPr>
+        </p:nvSpPr>
+        <p:spPr/>
+        <p:txBody>
+          <a:bodyPr/>
+          <a:lstStyle/>
+          <a:p>
+            <a:fld id="{B6F15528-21DE-4FAA-801E-634DDDAF4B2B}" type="slidenum">
+              <a:rPr lang="en-US" smtClean="0"/>
+              <a:pPr/>
+              <a:t>8</a:t>
+            </a:fld>
+            <a:endParaRPr lang="en-US"/>
           </a:p>
         </p:txBody>
       </p:sp>
     </p:spTree>
     <p:extLst>
       <p:ext uri="{BB962C8B-B14F-4D97-AF65-F5344CB8AC3E}">
-        <p14:creationId xmlns:p14="http://schemas.microsoft.com/office/powerpoint/2010/main" val="2980002542"/>
+        <p14:creationId xmlns:p14="http://schemas.microsoft.com/office/powerpoint/2010/main" val="2945344990"/>
       </p:ext>
     </p:extLst>
   </p:cSld>
@@ -8753,7 +10865,7 @@
       </p:grpSpPr>
       <p:sp>
         <p:nvSpPr>
-          <p:cNvPr id="2" name="Title 1"/>
+          <p:cNvPr id="4" name="Title 3"/>
           <p:cNvSpPr>
             <a:spLocks noGrp="1"/>
           </p:cNvSpPr>
@@ -8763,14 +10875,12 @@
         </p:nvSpPr>
         <p:spPr/>
         <p:txBody>
-          <a:bodyPr>
-            <a:normAutofit/>
-          </a:bodyPr>
+          <a:bodyPr/>
           <a:lstStyle/>
           <a:p>
             <a:r>
               <a:rPr lang="fr-FR" dirty="0" smtClean="0"/>
-              <a:t>Avez-vous des questions ?</a:t>
+              <a:t>Avantages</a:t>
             </a:r>
             <a:endParaRPr lang="fr-FR" dirty="0"/>
           </a:p>
@@ -8778,7 +10888,7 @@
       </p:sp>
       <p:sp>
         <p:nvSpPr>
-          <p:cNvPr id="3" name="Content Placeholder 2"/>
+          <p:cNvPr id="5" name="Content Placeholder 4"/>
           <p:cNvSpPr>
             <a:spLocks noGrp="1"/>
           </p:cNvSpPr>
@@ -8791,13 +10901,29 @@
           <a:bodyPr/>
           <a:lstStyle/>
           <a:p>
-            <a:endParaRPr lang="fr-FR"/>
-          </a:p>
-        </p:txBody>
-      </p:sp>
-      <p:sp>
-        <p:nvSpPr>
-          <p:cNvPr id="4" name="Slide Number Placeholder 3"/>
+            <a:r>
+              <a:rPr lang="fr-FR" dirty="0" smtClean="0"/>
+              <a:t>Ligne de commande</a:t>
+            </a:r>
+          </a:p>
+          <a:p>
+            <a:r>
+              <a:rPr lang="fr-FR" dirty="0" smtClean="0"/>
+              <a:t>Automatisation des tâches</a:t>
+            </a:r>
+          </a:p>
+          <a:p>
+            <a:r>
+              <a:rPr lang="fr-FR" dirty="0" smtClean="0"/>
+              <a:t>Paramétrable</a:t>
+            </a:r>
+            <a:endParaRPr lang="fr-FR" dirty="0"/>
+          </a:p>
+        </p:txBody>
+      </p:sp>
+      <p:sp>
+        <p:nvSpPr>
+          <p:cNvPr id="2" name="Slide Number Placeholder 1"/>
           <p:cNvSpPr>
             <a:spLocks noGrp="1"/>
           </p:cNvSpPr>
@@ -8822,7 +10948,7 @@
     </p:spTree>
     <p:extLst>
       <p:ext uri="{BB962C8B-B14F-4D97-AF65-F5344CB8AC3E}">
-        <p14:creationId xmlns:p14="http://schemas.microsoft.com/office/powerpoint/2010/main" val="3743810836"/>
+        <p14:creationId xmlns:p14="http://schemas.microsoft.com/office/powerpoint/2010/main" val="2434059902"/>
       </p:ext>
     </p:extLst>
   </p:cSld>

</xml_diff>